<commit_message>
Ajout de la Classe Pokemon, Initialisation
</commit_message>
<xml_diff>
--- a/Resume.pptx
+++ b/Resume.pptx
@@ -104,6 +104,11 @@
       </a:defRPr>
     </a:lvl9pPr>
   </p:defaultTextStyle>
+  <p:extLst>
+    <p:ext uri="{EFAFB233-063F-42B5-8137-9DF3F51BA10A}">
+      <p15:sldGuideLst xmlns:p15="http://schemas.microsoft.com/office/powerpoint/2012/main"/>
+    </p:ext>
+  </p:extLst>
 </p:presentation>
 </file>
 
@@ -3977,7 +3982,7 @@
         <p:spPr>
           <a:xfrm>
             <a:off x="713422" y="4143195"/>
-            <a:ext cx="1767840" cy="2123658"/>
+            <a:ext cx="1767840" cy="2292935"/>
           </a:xfrm>
           <a:prstGeom prst="rect">
             <a:avLst/>
@@ -4120,6 +4125,41 @@
                 </a:solidFill>
               </a:rPr>
               <a:t>Defense</a:t>
+            </a:r>
+            <a:endParaRPr lang="fr-FR" sz="1100" dirty="0">
+              <a:solidFill>
+                <a:srgbClr val="C00000"/>
+              </a:solidFill>
+            </a:endParaRPr>
+          </a:p>
+          <a:p>
+            <a:pPr marL="171450" indent="-171450">
+              <a:buFont typeface="Arial" panose="020B0604020202020204" pitchFamily="34" charset="0"/>
+              <a:buChar char="•"/>
+            </a:pPr>
+            <a:r>
+              <a:rPr lang="fr-FR" sz="1100" dirty="0" err="1">
+                <a:solidFill>
+                  <a:srgbClr val="C00000"/>
+                </a:solidFill>
+              </a:rPr>
+              <a:t>Defense</a:t>
+            </a:r>
+            <a:r>
+              <a:rPr lang="fr-FR" sz="1100" dirty="0">
+                <a:solidFill>
+                  <a:srgbClr val="C00000"/>
+                </a:solidFill>
+              </a:rPr>
+              <a:t> </a:t>
+            </a:r>
+            <a:r>
+              <a:rPr lang="fr-FR" sz="1100" dirty="0" err="1">
+                <a:solidFill>
+                  <a:srgbClr val="C00000"/>
+                </a:solidFill>
+              </a:rPr>
+              <a:t>Spe</a:t>
             </a:r>
             <a:endParaRPr lang="fr-FR" sz="1100" dirty="0">
               <a:solidFill>

</xml_diff>

<commit_message>
Initialisation de la class Pouvoir/Attaque
</commit_message>
<xml_diff>
--- a/Resume.pptx
+++ b/Resume.pptx
@@ -4225,8 +4225,8 @@
         </p:nvSpPr>
         <p:spPr>
           <a:xfrm>
-            <a:off x="4721542" y="2530762"/>
-            <a:ext cx="1767840" cy="1446550"/>
+            <a:off x="4536758" y="2559605"/>
+            <a:ext cx="1767840" cy="1107996"/>
           </a:xfrm>
           <a:prstGeom prst="rect">
             <a:avLst/>
@@ -4316,41 +4316,18 @@
               <a:buChar char="•"/>
             </a:pPr>
             <a:r>
-              <a:rPr lang="fr-FR" sz="1100" dirty="0">
+              <a:rPr lang="fr-FR" sz="1100">
                 <a:solidFill>
                   <a:srgbClr val="C00000"/>
                 </a:solidFill>
               </a:rPr>
               <a:t>PP</a:t>
             </a:r>
-          </a:p>
-          <a:p>
-            <a:pPr marL="171450" indent="-171450">
-              <a:buFont typeface="Arial" panose="020B0604020202020204" pitchFamily="34" charset="0"/>
-              <a:buChar char="•"/>
-            </a:pPr>
-            <a:r>
-              <a:rPr lang="fr-FR" sz="1100" dirty="0">
-                <a:solidFill>
-                  <a:srgbClr val="C00000"/>
-                </a:solidFill>
-              </a:rPr>
-              <a:t>Pouvoir Physique</a:t>
-            </a:r>
-          </a:p>
-          <a:p>
-            <a:pPr marL="171450" indent="-171450">
-              <a:buFont typeface="Arial" panose="020B0604020202020204" pitchFamily="34" charset="0"/>
-              <a:buChar char="•"/>
-            </a:pPr>
-            <a:r>
-              <a:rPr lang="fr-FR" sz="1100" dirty="0">
-                <a:solidFill>
-                  <a:srgbClr val="C00000"/>
-                </a:solidFill>
-              </a:rPr>
-              <a:t>Pouvoir Spécial</a:t>
-            </a:r>
+            <a:endParaRPr lang="fr-FR" sz="1100" dirty="0">
+              <a:solidFill>
+                <a:srgbClr val="C00000"/>
+              </a:solidFill>
+            </a:endParaRPr>
           </a:p>
         </p:txBody>
       </p:sp>

</xml_diff>

<commit_message>
Ajout de l'enum Type, Recherche Pokemon stat et pouvoir
</commit_message>
<xml_diff>
--- a/Resume.pptx
+++ b/Resume.pptx
@@ -6,6 +6,8 @@
   </p:sldMasterIdLst>
   <p:sldIdLst>
     <p:sldId id="256" r:id="rId2"/>
+    <p:sldId id="257" r:id="rId3"/>
+    <p:sldId id="258" r:id="rId4"/>
   </p:sldIdLst>
   <p:sldSz cx="12192000" cy="6858000"/>
   <p:notesSz cx="6858000" cy="9144000"/>
@@ -259,7 +261,7 @@
           <a:p>
             <a:fld id="{769780AF-EA56-41AC-8361-B9AF9FB6F450}" type="datetimeFigureOut">
               <a:rPr lang="fr-FR" smtClean="0"/>
-              <a:t>14/05/2018</a:t>
+              <a:t>15/05/2018</a:t>
             </a:fld>
             <a:endParaRPr lang="fr-FR"/>
           </a:p>
@@ -457,7 +459,7 @@
           <a:p>
             <a:fld id="{769780AF-EA56-41AC-8361-B9AF9FB6F450}" type="datetimeFigureOut">
               <a:rPr lang="fr-FR" smtClean="0"/>
-              <a:t>14/05/2018</a:t>
+              <a:t>15/05/2018</a:t>
             </a:fld>
             <a:endParaRPr lang="fr-FR"/>
           </a:p>
@@ -665,7 +667,7 @@
           <a:p>
             <a:fld id="{769780AF-EA56-41AC-8361-B9AF9FB6F450}" type="datetimeFigureOut">
               <a:rPr lang="fr-FR" smtClean="0"/>
-              <a:t>14/05/2018</a:t>
+              <a:t>15/05/2018</a:t>
             </a:fld>
             <a:endParaRPr lang="fr-FR"/>
           </a:p>
@@ -863,7 +865,7 @@
           <a:p>
             <a:fld id="{769780AF-EA56-41AC-8361-B9AF9FB6F450}" type="datetimeFigureOut">
               <a:rPr lang="fr-FR" smtClean="0"/>
-              <a:t>14/05/2018</a:t>
+              <a:t>15/05/2018</a:t>
             </a:fld>
             <a:endParaRPr lang="fr-FR"/>
           </a:p>
@@ -1138,7 +1140,7 @@
           <a:p>
             <a:fld id="{769780AF-EA56-41AC-8361-B9AF9FB6F450}" type="datetimeFigureOut">
               <a:rPr lang="fr-FR" smtClean="0"/>
-              <a:t>14/05/2018</a:t>
+              <a:t>15/05/2018</a:t>
             </a:fld>
             <a:endParaRPr lang="fr-FR"/>
           </a:p>
@@ -1403,7 +1405,7 @@
           <a:p>
             <a:fld id="{769780AF-EA56-41AC-8361-B9AF9FB6F450}" type="datetimeFigureOut">
               <a:rPr lang="fr-FR" smtClean="0"/>
-              <a:t>14/05/2018</a:t>
+              <a:t>15/05/2018</a:t>
             </a:fld>
             <a:endParaRPr lang="fr-FR"/>
           </a:p>
@@ -1815,7 +1817,7 @@
           <a:p>
             <a:fld id="{769780AF-EA56-41AC-8361-B9AF9FB6F450}" type="datetimeFigureOut">
               <a:rPr lang="fr-FR" smtClean="0"/>
-              <a:t>14/05/2018</a:t>
+              <a:t>15/05/2018</a:t>
             </a:fld>
             <a:endParaRPr lang="fr-FR"/>
           </a:p>
@@ -1956,7 +1958,7 @@
           <a:p>
             <a:fld id="{769780AF-EA56-41AC-8361-B9AF9FB6F450}" type="datetimeFigureOut">
               <a:rPr lang="fr-FR" smtClean="0"/>
-              <a:t>14/05/2018</a:t>
+              <a:t>15/05/2018</a:t>
             </a:fld>
             <a:endParaRPr lang="fr-FR"/>
           </a:p>
@@ -2069,7 +2071,7 @@
           <a:p>
             <a:fld id="{769780AF-EA56-41AC-8361-B9AF9FB6F450}" type="datetimeFigureOut">
               <a:rPr lang="fr-FR" smtClean="0"/>
-              <a:t>14/05/2018</a:t>
+              <a:t>15/05/2018</a:t>
             </a:fld>
             <a:endParaRPr lang="fr-FR"/>
           </a:p>
@@ -2380,7 +2382,7 @@
           <a:p>
             <a:fld id="{769780AF-EA56-41AC-8361-B9AF9FB6F450}" type="datetimeFigureOut">
               <a:rPr lang="fr-FR" smtClean="0"/>
-              <a:t>14/05/2018</a:t>
+              <a:t>15/05/2018</a:t>
             </a:fld>
             <a:endParaRPr lang="fr-FR"/>
           </a:p>
@@ -2668,7 +2670,7 @@
           <a:p>
             <a:fld id="{769780AF-EA56-41AC-8361-B9AF9FB6F450}" type="datetimeFigureOut">
               <a:rPr lang="fr-FR" smtClean="0"/>
-              <a:t>14/05/2018</a:t>
+              <a:t>15/05/2018</a:t>
             </a:fld>
             <a:endParaRPr lang="fr-FR"/>
           </a:p>
@@ -2909,7 +2911,7 @@
           <a:p>
             <a:fld id="{769780AF-EA56-41AC-8361-B9AF9FB6F450}" type="datetimeFigureOut">
               <a:rPr lang="fr-FR" smtClean="0"/>
-              <a:t>14/05/2018</a:t>
+              <a:t>15/05/2018</a:t>
             </a:fld>
             <a:endParaRPr lang="fr-FR"/>
           </a:p>
@@ -4226,7 +4228,7 @@
         <p:spPr>
           <a:xfrm>
             <a:off x="4536758" y="2559605"/>
-            <a:ext cx="1767840" cy="1107996"/>
+            <a:ext cx="1767840" cy="1277273"/>
           </a:xfrm>
           <a:prstGeom prst="rect">
             <a:avLst/>
@@ -4316,18 +4318,27 @@
               <a:buChar char="•"/>
             </a:pPr>
             <a:r>
-              <a:rPr lang="fr-FR" sz="1100">
+              <a:rPr lang="fr-FR" sz="1100" dirty="0">
                 <a:solidFill>
                   <a:srgbClr val="C00000"/>
                 </a:solidFill>
               </a:rPr>
               <a:t>PP</a:t>
             </a:r>
-            <a:endParaRPr lang="fr-FR" sz="1100" dirty="0">
-              <a:solidFill>
-                <a:srgbClr val="C00000"/>
-              </a:solidFill>
-            </a:endParaRPr>
+          </a:p>
+          <a:p>
+            <a:pPr marL="171450" indent="-171450">
+              <a:buFont typeface="Arial" panose="020B0604020202020204" pitchFamily="34" charset="0"/>
+              <a:buChar char="•"/>
+            </a:pPr>
+            <a:r>
+              <a:rPr lang="fr-FR" sz="1100" dirty="0">
+                <a:solidFill>
+                  <a:srgbClr val="C00000"/>
+                </a:solidFill>
+              </a:rPr>
+              <a:t>Catégorie</a:t>
+            </a:r>
           </a:p>
         </p:txBody>
       </p:sp>
@@ -4345,7 +4356,7 @@
         </p:nvSpPr>
         <p:spPr>
           <a:xfrm>
-            <a:off x="3539488" y="4494668"/>
+            <a:off x="3398518" y="4477345"/>
             <a:ext cx="1767840" cy="769441"/>
           </a:xfrm>
           <a:prstGeom prst="rect">
@@ -4408,13 +4419,639 @@
               <a:buChar char="•"/>
             </a:pPr>
             <a:r>
-              <a:rPr lang="fr-FR" sz="1100" dirty="0">
+              <a:rPr lang="fr-FR" sz="1100" dirty="0" err="1">
                 <a:solidFill>
-                  <a:srgbClr val="C00000"/>
+                  <a:srgbClr val="FF0000"/>
                 </a:solidFill>
               </a:rPr>
-              <a:t>Heal</a:t>
-            </a:r>
+              <a:t>RestaurationPV</a:t>
+            </a:r>
+            <a:endParaRPr lang="fr-FR" sz="1100" dirty="0">
+              <a:solidFill>
+                <a:srgbClr val="FF0000"/>
+              </a:solidFill>
+            </a:endParaRPr>
+          </a:p>
+        </p:txBody>
+      </p:sp>
+      <p:sp>
+        <p:nvSpPr>
+          <p:cNvPr id="2" name="ZoneTexte 1">
+            <a:extLst>
+              <a:ext uri="{FF2B5EF4-FFF2-40B4-BE49-F238E27FC236}">
+                <a16:creationId xmlns:a16="http://schemas.microsoft.com/office/drawing/2014/main" id="{B6C9BD9B-D2E2-45E8-AF82-D171021449D0}"/>
+              </a:ext>
+            </a:extLst>
+          </p:cNvPr>
+          <p:cNvSpPr txBox="1"/>
+          <p:nvPr/>
+        </p:nvSpPr>
+        <p:spPr>
+          <a:xfrm>
+            <a:off x="5228272" y="3825322"/>
+            <a:ext cx="1076326" cy="2928679"/>
+          </a:xfrm>
+          <a:prstGeom prst="rect">
+            <a:avLst/>
+          </a:prstGeom>
+          <a:noFill/>
+        </p:spPr>
+        <p:txBody>
+          <a:bodyPr wrap="square" rtlCol="0">
+            <a:spAutoFit/>
+          </a:bodyPr>
+          <a:lstStyle/>
+          <a:p>
+            <a:pPr marL="171450" indent="-171450">
+              <a:buFont typeface="Arial" panose="020B0604020202020204" pitchFamily="34" charset="0"/>
+              <a:buChar char="•"/>
+            </a:pPr>
+            <a:r>
+              <a:rPr lang="fr-FR" sz="800" dirty="0"/>
+              <a:t>FEU</a:t>
+            </a:r>
+          </a:p>
+          <a:p>
+            <a:pPr marL="171450" indent="-171450">
+              <a:buFont typeface="Arial" panose="020B0604020202020204" pitchFamily="34" charset="0"/>
+              <a:buChar char="•"/>
+            </a:pPr>
+            <a:r>
+              <a:rPr lang="fr-FR" sz="800" dirty="0"/>
+              <a:t>EAU</a:t>
+            </a:r>
+          </a:p>
+          <a:p>
+            <a:pPr marL="171450" indent="-171450">
+              <a:buFont typeface="Arial" panose="020B0604020202020204" pitchFamily="34" charset="0"/>
+              <a:buChar char="•"/>
+            </a:pPr>
+            <a:r>
+              <a:rPr lang="fr-FR" sz="800" dirty="0"/>
+              <a:t>PLANTES</a:t>
+            </a:r>
+          </a:p>
+          <a:p>
+            <a:pPr marL="171450" indent="-171450">
+              <a:buFont typeface="Arial" panose="020B0604020202020204" pitchFamily="34" charset="0"/>
+              <a:buChar char="•"/>
+            </a:pPr>
+            <a:r>
+              <a:rPr lang="fr-FR" sz="800" dirty="0"/>
+              <a:t>SPECTRE</a:t>
+            </a:r>
+          </a:p>
+          <a:p>
+            <a:pPr marL="171450" indent="-171450">
+              <a:buFont typeface="Arial" panose="020B0604020202020204" pitchFamily="34" charset="0"/>
+              <a:buChar char="•"/>
+            </a:pPr>
+            <a:r>
+              <a:rPr lang="fr-FR" sz="800" dirty="0"/>
+              <a:t>TENEBRE</a:t>
+            </a:r>
+          </a:p>
+          <a:p>
+            <a:pPr marL="171450" indent="-171450">
+              <a:buFont typeface="Arial" panose="020B0604020202020204" pitchFamily="34" charset="0"/>
+              <a:buChar char="•"/>
+            </a:pPr>
+            <a:r>
+              <a:rPr lang="fr-FR" sz="800" dirty="0"/>
+              <a:t>DRAGON</a:t>
+            </a:r>
+          </a:p>
+          <a:p>
+            <a:pPr marL="171450" indent="-171450">
+              <a:buFont typeface="Arial" panose="020B0604020202020204" pitchFamily="34" charset="0"/>
+              <a:buChar char="•"/>
+            </a:pPr>
+            <a:r>
+              <a:rPr lang="fr-FR" sz="800" dirty="0"/>
+              <a:t>ACIER</a:t>
+            </a:r>
+          </a:p>
+          <a:p>
+            <a:pPr marL="171450" indent="-171450">
+              <a:buFont typeface="Arial" panose="020B0604020202020204" pitchFamily="34" charset="0"/>
+              <a:buChar char="•"/>
+            </a:pPr>
+            <a:r>
+              <a:rPr lang="fr-FR" sz="800" dirty="0"/>
+              <a:t>INSECTE</a:t>
+            </a:r>
+          </a:p>
+          <a:p>
+            <a:pPr marL="171450" indent="-171450">
+              <a:buFont typeface="Arial" panose="020B0604020202020204" pitchFamily="34" charset="0"/>
+              <a:buChar char="•"/>
+            </a:pPr>
+            <a:r>
+              <a:rPr lang="fr-FR" sz="800" dirty="0"/>
+              <a:t>ELECTRIQUE</a:t>
+            </a:r>
+          </a:p>
+          <a:p>
+            <a:pPr marL="171450" indent="-171450">
+              <a:buFont typeface="Arial" panose="020B0604020202020204" pitchFamily="34" charset="0"/>
+              <a:buChar char="•"/>
+            </a:pPr>
+            <a:r>
+              <a:rPr lang="fr-FR" sz="800" dirty="0"/>
+              <a:t>COMBAT</a:t>
+            </a:r>
+          </a:p>
+          <a:p>
+            <a:pPr marL="171450" indent="-171450">
+              <a:buFont typeface="Arial" panose="020B0604020202020204" pitchFamily="34" charset="0"/>
+              <a:buChar char="•"/>
+            </a:pPr>
+            <a:r>
+              <a:rPr lang="fr-FR" sz="800" dirty="0"/>
+              <a:t>GLACE</a:t>
+            </a:r>
+          </a:p>
+          <a:p>
+            <a:pPr marL="171450" indent="-171450">
+              <a:buFont typeface="Arial" panose="020B0604020202020204" pitchFamily="34" charset="0"/>
+              <a:buChar char="•"/>
+            </a:pPr>
+            <a:r>
+              <a:rPr lang="fr-FR" sz="800" dirty="0"/>
+              <a:t>FEE</a:t>
+            </a:r>
+          </a:p>
+          <a:p>
+            <a:pPr marL="171450" indent="-171450">
+              <a:buFont typeface="Arial" panose="020B0604020202020204" pitchFamily="34" charset="0"/>
+              <a:buChar char="•"/>
+            </a:pPr>
+            <a:r>
+              <a:rPr lang="fr-FR" sz="800" dirty="0"/>
+              <a:t>NORMALE</a:t>
+            </a:r>
+          </a:p>
+          <a:p>
+            <a:pPr marL="171450" indent="-171450">
+              <a:buFont typeface="Arial" panose="020B0604020202020204" pitchFamily="34" charset="0"/>
+              <a:buChar char="•"/>
+            </a:pPr>
+            <a:r>
+              <a:rPr lang="fr-FR" sz="800" dirty="0"/>
+              <a:t>POISON</a:t>
+            </a:r>
+          </a:p>
+          <a:p>
+            <a:pPr marL="171450" indent="-171450">
+              <a:buFont typeface="Arial" panose="020B0604020202020204" pitchFamily="34" charset="0"/>
+              <a:buChar char="•"/>
+            </a:pPr>
+            <a:r>
+              <a:rPr lang="fr-FR" sz="800" dirty="0"/>
+              <a:t>PSY</a:t>
+            </a:r>
+          </a:p>
+          <a:p>
+            <a:pPr marL="171450" indent="-171450">
+              <a:buFont typeface="Arial" panose="020B0604020202020204" pitchFamily="34" charset="0"/>
+              <a:buChar char="•"/>
+            </a:pPr>
+            <a:r>
+              <a:rPr lang="fr-FR" sz="800" dirty="0"/>
+              <a:t>ROCHE</a:t>
+            </a:r>
+          </a:p>
+          <a:p>
+            <a:pPr marL="171450" indent="-171450">
+              <a:buFont typeface="Arial" panose="020B0604020202020204" pitchFamily="34" charset="0"/>
+              <a:buChar char="•"/>
+            </a:pPr>
+            <a:r>
+              <a:rPr lang="fr-FR" sz="800" dirty="0"/>
+              <a:t>SOL</a:t>
+            </a:r>
+          </a:p>
+          <a:p>
+            <a:pPr marL="171450" indent="-171450">
+              <a:buFont typeface="Arial" panose="020B0604020202020204" pitchFamily="34" charset="0"/>
+              <a:buChar char="•"/>
+            </a:pPr>
+            <a:r>
+              <a:rPr lang="fr-FR" sz="800" dirty="0"/>
+              <a:t>VOL</a:t>
+            </a:r>
+          </a:p>
+          <a:p>
+            <a:pPr marL="171450" indent="-171450">
+              <a:buFont typeface="Arial" panose="020B0604020202020204" pitchFamily="34" charset="0"/>
+              <a:buChar char="•"/>
+            </a:pPr>
+            <a:endParaRPr lang="fr-FR" sz="900" dirty="0"/>
+          </a:p>
+          <a:p>
+            <a:pPr marL="171450" indent="-171450">
+              <a:buFont typeface="Arial" panose="020B0604020202020204" pitchFamily="34" charset="0"/>
+              <a:buChar char="•"/>
+            </a:pPr>
+            <a:endParaRPr lang="fr-FR" sz="900" dirty="0"/>
+          </a:p>
+          <a:p>
+            <a:pPr marL="171450" indent="-171450">
+              <a:buFont typeface="Arial" panose="020B0604020202020204" pitchFamily="34" charset="0"/>
+              <a:buChar char="•"/>
+            </a:pPr>
+            <a:endParaRPr lang="fr-FR" sz="900" dirty="0"/>
+          </a:p>
+          <a:p>
+            <a:pPr marL="171450" indent="-171450">
+              <a:buFont typeface="Arial" panose="020B0604020202020204" pitchFamily="34" charset="0"/>
+              <a:buChar char="•"/>
+            </a:pPr>
+            <a:endParaRPr lang="fr-FR" sz="900" dirty="0"/>
+          </a:p>
+        </p:txBody>
+      </p:sp>
+      <p:sp>
+        <p:nvSpPr>
+          <p:cNvPr id="20" name="ZoneTexte 19">
+            <a:extLst>
+              <a:ext uri="{FF2B5EF4-FFF2-40B4-BE49-F238E27FC236}">
+                <a16:creationId xmlns:a16="http://schemas.microsoft.com/office/drawing/2014/main" id="{D1BCA3CC-C331-4AE7-83FF-FE9F98815DFA}"/>
+              </a:ext>
+            </a:extLst>
+          </p:cNvPr>
+          <p:cNvSpPr txBox="1"/>
+          <p:nvPr/>
+        </p:nvSpPr>
+        <p:spPr>
+          <a:xfrm>
+            <a:off x="7411080" y="1574720"/>
+            <a:ext cx="2742569" cy="923330"/>
+          </a:xfrm>
+          <a:prstGeom prst="rect">
+            <a:avLst/>
+          </a:prstGeom>
+          <a:noFill/>
+        </p:spPr>
+        <p:txBody>
+          <a:bodyPr wrap="square" rtlCol="0">
+            <a:spAutoFit/>
+          </a:bodyPr>
+          <a:lstStyle/>
+          <a:p>
+            <a:pPr lvl="5"/>
+            <a:r>
+              <a:rPr lang="fr-FR" sz="900" dirty="0"/>
+              <a:t>	</a:t>
+            </a:r>
+          </a:p>
+          <a:p>
+            <a:pPr lvl="2"/>
+            <a:r>
+              <a:rPr lang="fr-FR" sz="900" dirty="0"/>
+              <a:t> </a:t>
+            </a:r>
+          </a:p>
+          <a:p>
+            <a:pPr lvl="2"/>
+            <a:r>
+              <a:rPr lang="fr-FR" sz="900" dirty="0"/>
+              <a:t>	</a:t>
+            </a:r>
+          </a:p>
+          <a:p>
+            <a:pPr marL="171450" indent="-171450">
+              <a:buFont typeface="Arial" panose="020B0604020202020204" pitchFamily="34" charset="0"/>
+              <a:buChar char="•"/>
+            </a:pPr>
+            <a:endParaRPr lang="fr-FR" sz="900" dirty="0"/>
+          </a:p>
+          <a:p>
+            <a:pPr marL="171450" indent="-171450">
+              <a:buFont typeface="Arial" panose="020B0604020202020204" pitchFamily="34" charset="0"/>
+              <a:buChar char="•"/>
+            </a:pPr>
+            <a:endParaRPr lang="fr-FR" sz="900" dirty="0"/>
+          </a:p>
+          <a:p>
+            <a:pPr marL="171450" indent="-171450">
+              <a:buFont typeface="Arial" panose="020B0604020202020204" pitchFamily="34" charset="0"/>
+              <a:buChar char="•"/>
+            </a:pPr>
+            <a:endParaRPr lang="fr-FR" sz="900" dirty="0"/>
+          </a:p>
+        </p:txBody>
+      </p:sp>
+      <p:sp>
+        <p:nvSpPr>
+          <p:cNvPr id="3" name="ZoneTexte 2">
+            <a:extLst>
+              <a:ext uri="{FF2B5EF4-FFF2-40B4-BE49-F238E27FC236}">
+                <a16:creationId xmlns:a16="http://schemas.microsoft.com/office/drawing/2014/main" id="{11F404EB-18BC-4669-B0ED-F56DE25B6992}"/>
+              </a:ext>
+            </a:extLst>
+          </p:cNvPr>
+          <p:cNvSpPr txBox="1"/>
+          <p:nvPr/>
+        </p:nvSpPr>
+        <p:spPr>
+          <a:xfrm>
+            <a:off x="7219948" y="1143833"/>
+            <a:ext cx="4648204" cy="4555093"/>
+          </a:xfrm>
+          <a:prstGeom prst="rect">
+            <a:avLst/>
+          </a:prstGeom>
+          <a:noFill/>
+        </p:spPr>
+        <p:txBody>
+          <a:bodyPr wrap="square" rtlCol="0">
+            <a:spAutoFit/>
+          </a:bodyPr>
+          <a:lstStyle/>
+          <a:p>
+            <a:r>
+              <a:rPr lang="fr-FR" sz="800" dirty="0"/>
+              <a:t>❖ Roche / Vol	</a:t>
+            </a:r>
+          </a:p>
+          <a:p>
+            <a:r>
+              <a:rPr lang="fr-FR" sz="800" dirty="0"/>
+              <a:t>	➢</a:t>
+            </a:r>
+            <a:r>
+              <a:rPr lang="fr-FR" sz="800" dirty="0" err="1"/>
+              <a:t>Aerodactyl</a:t>
+            </a:r>
+            <a:endParaRPr lang="fr-FR" sz="800" dirty="0"/>
+          </a:p>
+          <a:p>
+            <a:r>
+              <a:rPr lang="fr-FR" sz="800" dirty="0"/>
+              <a:t>		• </a:t>
+            </a:r>
+            <a:r>
+              <a:rPr lang="fr-FR" sz="800" dirty="0" err="1"/>
+              <a:t>Seisme</a:t>
+            </a:r>
+            <a:r>
+              <a:rPr lang="fr-FR" sz="800" dirty="0"/>
+              <a:t> 	* sol	*</a:t>
+            </a:r>
+          </a:p>
+          <a:p>
+            <a:r>
+              <a:rPr lang="fr-FR" sz="800" dirty="0"/>
+              <a:t>		• Vol 	* vol	*</a:t>
+            </a:r>
+          </a:p>
+          <a:p>
+            <a:r>
+              <a:rPr lang="fr-FR" sz="800" dirty="0"/>
+              <a:t>		• Cyclone	* vol	*</a:t>
+            </a:r>
+          </a:p>
+          <a:p>
+            <a:r>
+              <a:rPr lang="fr-FR" sz="800" dirty="0"/>
+              <a:t>		• Eclate-Roc	* Roche	*</a:t>
+            </a:r>
+          </a:p>
+          <a:p>
+            <a:r>
+              <a:rPr lang="fr-FR" sz="800" dirty="0"/>
+              <a:t>❖Insecte / combat</a:t>
+            </a:r>
+          </a:p>
+          <a:p>
+            <a:r>
+              <a:rPr lang="fr-FR" sz="800" dirty="0"/>
+              <a:t>	 ➢</a:t>
+            </a:r>
+            <a:r>
+              <a:rPr lang="fr-FR" sz="800" dirty="0" err="1"/>
+              <a:t>Heracross</a:t>
+            </a:r>
+            <a:endParaRPr lang="fr-FR" sz="800" dirty="0"/>
+          </a:p>
+          <a:p>
+            <a:r>
+              <a:rPr lang="fr-FR" sz="800" dirty="0"/>
+              <a:t>		• Balayette	* combat	*</a:t>
+            </a:r>
+          </a:p>
+          <a:p>
+            <a:r>
+              <a:rPr lang="fr-FR" sz="800" dirty="0"/>
+              <a:t>		• </a:t>
+            </a:r>
+            <a:r>
+              <a:rPr lang="fr-FR" sz="800" dirty="0" err="1"/>
+              <a:t>Buldoboule</a:t>
+            </a:r>
+            <a:r>
+              <a:rPr lang="fr-FR" sz="800" dirty="0"/>
+              <a:t>	* Insecte	*</a:t>
+            </a:r>
+          </a:p>
+          <a:p>
+            <a:r>
+              <a:rPr lang="fr-FR" sz="800" dirty="0"/>
+              <a:t>		• Yama </a:t>
+            </a:r>
+            <a:r>
+              <a:rPr lang="fr-FR" sz="800" dirty="0" err="1"/>
+              <a:t>arashi</a:t>
+            </a:r>
+            <a:r>
+              <a:rPr lang="fr-FR" sz="800" dirty="0"/>
+              <a:t>	* combat	*</a:t>
+            </a:r>
+          </a:p>
+          <a:p>
+            <a:r>
+              <a:rPr lang="fr-FR" sz="800" dirty="0"/>
+              <a:t>		• Force	* combat	*</a:t>
+            </a:r>
+          </a:p>
+          <a:p>
+            <a:r>
+              <a:rPr lang="fr-FR" sz="800" dirty="0"/>
+              <a:t>❖ Spectre / Feu</a:t>
+            </a:r>
+          </a:p>
+          <a:p>
+            <a:r>
+              <a:rPr lang="fr-FR" sz="800" dirty="0"/>
+              <a:t>	 ➢ </a:t>
+            </a:r>
+            <a:r>
+              <a:rPr lang="fr-FR" sz="800" dirty="0" err="1"/>
+              <a:t>Chandelure</a:t>
+            </a:r>
+            <a:endParaRPr lang="fr-FR" sz="800" dirty="0"/>
+          </a:p>
+          <a:p>
+            <a:r>
+              <a:rPr lang="fr-FR" sz="800" dirty="0"/>
+              <a:t>		• Torche	*feu	*</a:t>
+            </a:r>
+          </a:p>
+          <a:p>
+            <a:r>
+              <a:rPr lang="fr-FR" sz="800" dirty="0"/>
+              <a:t>		• Corp ardent	* feu	*</a:t>
+            </a:r>
+          </a:p>
+          <a:p>
+            <a:r>
+              <a:rPr lang="fr-FR" sz="800" dirty="0"/>
+              <a:t>		• Infiltration	*spectre	*</a:t>
+            </a:r>
+          </a:p>
+          <a:p>
+            <a:r>
+              <a:rPr lang="fr-FR" sz="800" dirty="0"/>
+              <a:t>		• Malédiction	*spectre	*</a:t>
+            </a:r>
+          </a:p>
+          <a:p>
+            <a:r>
+              <a:rPr lang="fr-FR" sz="800" dirty="0"/>
+              <a:t>❖ Sol / </a:t>
+            </a:r>
+            <a:r>
+              <a:rPr lang="fr-FR" sz="800" dirty="0" err="1"/>
+              <a:t>Tenebre</a:t>
+            </a:r>
+            <a:endParaRPr lang="fr-FR" sz="800" dirty="0"/>
+          </a:p>
+          <a:p>
+            <a:r>
+              <a:rPr lang="fr-FR" sz="800" dirty="0"/>
+              <a:t>	 ➢ </a:t>
+            </a:r>
+            <a:r>
+              <a:rPr lang="fr-FR" sz="800" dirty="0" err="1"/>
+              <a:t>Krookodile</a:t>
+            </a:r>
+            <a:r>
+              <a:rPr lang="fr-FR" sz="800" dirty="0"/>
+              <a:t>		</a:t>
+            </a:r>
+          </a:p>
+          <a:p>
+            <a:r>
+              <a:rPr lang="fr-FR" sz="800" dirty="0"/>
+              <a:t>		• Tunnelier	* sol	*</a:t>
+            </a:r>
+          </a:p>
+          <a:p>
+            <a:r>
+              <a:rPr lang="fr-FR" sz="800" dirty="0"/>
+              <a:t>		• Roulade	* normal	*	</a:t>
+            </a:r>
+          </a:p>
+          <a:p>
+            <a:r>
+              <a:rPr lang="fr-FR" sz="800" dirty="0"/>
+              <a:t>		• Morsure	* </a:t>
+            </a:r>
+            <a:r>
+              <a:rPr lang="fr-FR" sz="800" dirty="0" err="1"/>
+              <a:t>tenebre</a:t>
+            </a:r>
+            <a:r>
+              <a:rPr lang="fr-FR" sz="800" dirty="0"/>
+              <a:t>	*</a:t>
+            </a:r>
+          </a:p>
+          <a:p>
+            <a:r>
+              <a:rPr lang="fr-FR" sz="800" dirty="0"/>
+              <a:t>		• </a:t>
+            </a:r>
+            <a:r>
+              <a:rPr lang="fr-FR" sz="800" dirty="0" err="1"/>
+              <a:t>Larçin</a:t>
+            </a:r>
+            <a:r>
+              <a:rPr lang="fr-FR" sz="800" dirty="0"/>
+              <a:t>	* </a:t>
+            </a:r>
+            <a:r>
+              <a:rPr lang="fr-FR" sz="800" dirty="0" err="1"/>
+              <a:t>tenebre</a:t>
+            </a:r>
+            <a:r>
+              <a:rPr lang="fr-FR" sz="800" dirty="0"/>
+              <a:t>	*</a:t>
+            </a:r>
+          </a:p>
+          <a:p>
+            <a:r>
+              <a:rPr lang="fr-FR" sz="800" dirty="0"/>
+              <a:t>❖ Sol / </a:t>
+            </a:r>
+            <a:r>
+              <a:rPr lang="fr-FR" sz="800" dirty="0" err="1"/>
+              <a:t>Tenebre</a:t>
+            </a:r>
+            <a:endParaRPr lang="fr-FR" sz="800" dirty="0"/>
+          </a:p>
+          <a:p>
+            <a:r>
+              <a:rPr lang="fr-FR" sz="800" dirty="0"/>
+              <a:t>	 ➢ </a:t>
+            </a:r>
+            <a:r>
+              <a:rPr lang="fr-FR" sz="800" dirty="0" err="1"/>
+              <a:t>Krookodile</a:t>
+            </a:r>
+            <a:r>
+              <a:rPr lang="fr-FR" sz="800" dirty="0"/>
+              <a:t>		</a:t>
+            </a:r>
+          </a:p>
+          <a:p>
+            <a:r>
+              <a:rPr lang="fr-FR" sz="800" dirty="0"/>
+              <a:t>		• Tunnel		</a:t>
+            </a:r>
+          </a:p>
+          <a:p>
+            <a:r>
+              <a:rPr lang="fr-FR" sz="800" dirty="0"/>
+              <a:t>		• Roulade</a:t>
+            </a:r>
+          </a:p>
+          <a:p>
+            <a:r>
+              <a:rPr lang="fr-FR" sz="800" dirty="0"/>
+              <a:t>		• Morsure</a:t>
+            </a:r>
+          </a:p>
+          <a:p>
+            <a:r>
+              <a:rPr lang="fr-FR" sz="800" dirty="0"/>
+              <a:t>		• Balle sombre</a:t>
+            </a:r>
+          </a:p>
+          <a:p>
+            <a:endParaRPr lang="fr-FR" sz="800" dirty="0"/>
+          </a:p>
+          <a:p>
+            <a:endParaRPr lang="fr-FR" sz="800" dirty="0"/>
+          </a:p>
+          <a:p>
+            <a:r>
+              <a:rPr lang="fr-FR" sz="800" dirty="0"/>
+              <a:t>		</a:t>
+            </a:r>
+          </a:p>
+          <a:p>
+            <a:endParaRPr lang="fr-FR" dirty="0"/>
           </a:p>
         </p:txBody>
       </p:sp>
@@ -4422,6 +5059,3191 @@
     <p:extLst>
       <p:ext uri="{BB962C8B-B14F-4D97-AF65-F5344CB8AC3E}">
         <p14:creationId xmlns:p14="http://schemas.microsoft.com/office/powerpoint/2010/main" val="3225072423"/>
+      </p:ext>
+    </p:extLst>
+  </p:cSld>
+  <p:clrMapOvr>
+    <a:masterClrMapping/>
+  </p:clrMapOvr>
+</p:sld>
+</file>
+
+<file path=ppt/slides/slide2.xml><?xml version="1.0" encoding="utf-8"?>
+<p:sld xmlns:a="http://schemas.openxmlformats.org/drawingml/2006/main" xmlns:r="http://schemas.openxmlformats.org/officeDocument/2006/relationships" xmlns:p="http://schemas.openxmlformats.org/presentationml/2006/main">
+  <p:cSld>
+    <p:spTree>
+      <p:nvGrpSpPr>
+        <p:cNvPr id="1" name=""/>
+        <p:cNvGrpSpPr/>
+        <p:nvPr/>
+      </p:nvGrpSpPr>
+      <p:grpSpPr>
+        <a:xfrm>
+          <a:off x="0" y="0"/>
+          <a:ext cx="0" cy="0"/>
+          <a:chOff x="0" y="0"/>
+          <a:chExt cx="0" cy="0"/>
+        </a:xfrm>
+      </p:grpSpPr>
+      <p:graphicFrame>
+        <p:nvGraphicFramePr>
+          <p:cNvPr id="5" name="Tableau 4">
+            <a:extLst>
+              <a:ext uri="{FF2B5EF4-FFF2-40B4-BE49-F238E27FC236}">
+                <a16:creationId xmlns:a16="http://schemas.microsoft.com/office/drawing/2014/main" id="{7B451BD0-7878-4925-80E1-76DB9305FFB3}"/>
+              </a:ext>
+            </a:extLst>
+          </p:cNvPr>
+          <p:cNvGraphicFramePr>
+            <a:graphicFrameLocks noGrp="1"/>
+          </p:cNvGraphicFramePr>
+          <p:nvPr>
+            <p:extLst>
+              <p:ext uri="{D42A27DB-BD31-4B8C-83A1-F6EECF244321}">
+                <p14:modId xmlns:p14="http://schemas.microsoft.com/office/powerpoint/2010/main" val="2725766881"/>
+              </p:ext>
+            </p:extLst>
+          </p:nvPr>
+        </p:nvGraphicFramePr>
+        <p:xfrm>
+          <a:off x="374700" y="1097280"/>
+          <a:ext cx="11442600" cy="4146170"/>
+        </p:xfrm>
+        <a:graphic>
+          <a:graphicData uri="http://schemas.openxmlformats.org/drawingml/2006/table">
+            <a:tbl>
+              <a:tblPr firstRow="1" bandRow="1">
+                <a:tableStyleId>{073A0DAA-6AF3-43AB-8588-CEC1D06C72B9}</a:tableStyleId>
+              </a:tblPr>
+              <a:tblGrid>
+                <a:gridCol w="953550">
+                  <a:extLst>
+                    <a:ext uri="{9D8B030D-6E8A-4147-A177-3AD203B41FA5}">
+                      <a16:colId xmlns:a16="http://schemas.microsoft.com/office/drawing/2014/main" val="3204059839"/>
+                    </a:ext>
+                  </a:extLst>
+                </a:gridCol>
+                <a:gridCol w="953550">
+                  <a:extLst>
+                    <a:ext uri="{9D8B030D-6E8A-4147-A177-3AD203B41FA5}">
+                      <a16:colId xmlns:a16="http://schemas.microsoft.com/office/drawing/2014/main" val="1638696339"/>
+                    </a:ext>
+                  </a:extLst>
+                </a:gridCol>
+                <a:gridCol w="953550">
+                  <a:extLst>
+                    <a:ext uri="{9D8B030D-6E8A-4147-A177-3AD203B41FA5}">
+                      <a16:colId xmlns:a16="http://schemas.microsoft.com/office/drawing/2014/main" val="1694572338"/>
+                    </a:ext>
+                  </a:extLst>
+                </a:gridCol>
+                <a:gridCol w="953550">
+                  <a:extLst>
+                    <a:ext uri="{9D8B030D-6E8A-4147-A177-3AD203B41FA5}">
+                      <a16:colId xmlns:a16="http://schemas.microsoft.com/office/drawing/2014/main" val="1817226097"/>
+                    </a:ext>
+                  </a:extLst>
+                </a:gridCol>
+                <a:gridCol w="953550">
+                  <a:extLst>
+                    <a:ext uri="{9D8B030D-6E8A-4147-A177-3AD203B41FA5}">
+                      <a16:colId xmlns:a16="http://schemas.microsoft.com/office/drawing/2014/main" val="1032482738"/>
+                    </a:ext>
+                  </a:extLst>
+                </a:gridCol>
+                <a:gridCol w="953550">
+                  <a:extLst>
+                    <a:ext uri="{9D8B030D-6E8A-4147-A177-3AD203B41FA5}">
+                      <a16:colId xmlns:a16="http://schemas.microsoft.com/office/drawing/2014/main" val="2243804602"/>
+                    </a:ext>
+                  </a:extLst>
+                </a:gridCol>
+                <a:gridCol w="953550">
+                  <a:extLst>
+                    <a:ext uri="{9D8B030D-6E8A-4147-A177-3AD203B41FA5}">
+                      <a16:colId xmlns:a16="http://schemas.microsoft.com/office/drawing/2014/main" val="2363909587"/>
+                    </a:ext>
+                  </a:extLst>
+                </a:gridCol>
+                <a:gridCol w="953550">
+                  <a:extLst>
+                    <a:ext uri="{9D8B030D-6E8A-4147-A177-3AD203B41FA5}">
+                      <a16:colId xmlns:a16="http://schemas.microsoft.com/office/drawing/2014/main" val="2050495864"/>
+                    </a:ext>
+                  </a:extLst>
+                </a:gridCol>
+                <a:gridCol w="953550">
+                  <a:extLst>
+                    <a:ext uri="{9D8B030D-6E8A-4147-A177-3AD203B41FA5}">
+                      <a16:colId xmlns:a16="http://schemas.microsoft.com/office/drawing/2014/main" val="3290253998"/>
+                    </a:ext>
+                  </a:extLst>
+                </a:gridCol>
+                <a:gridCol w="953550">
+                  <a:extLst>
+                    <a:ext uri="{9D8B030D-6E8A-4147-A177-3AD203B41FA5}">
+                      <a16:colId xmlns:a16="http://schemas.microsoft.com/office/drawing/2014/main" val="696849395"/>
+                    </a:ext>
+                  </a:extLst>
+                </a:gridCol>
+                <a:gridCol w="953550">
+                  <a:extLst>
+                    <a:ext uri="{9D8B030D-6E8A-4147-A177-3AD203B41FA5}">
+                      <a16:colId xmlns:a16="http://schemas.microsoft.com/office/drawing/2014/main" val="4008523773"/>
+                    </a:ext>
+                  </a:extLst>
+                </a:gridCol>
+                <a:gridCol w="953550">
+                  <a:extLst>
+                    <a:ext uri="{9D8B030D-6E8A-4147-A177-3AD203B41FA5}">
+                      <a16:colId xmlns:a16="http://schemas.microsoft.com/office/drawing/2014/main" val="2628736819"/>
+                    </a:ext>
+                  </a:extLst>
+                </a:gridCol>
+              </a:tblGrid>
+              <a:tr h="359288">
+                <a:tc>
+                  <a:txBody>
+                    <a:bodyPr/>
+                    <a:lstStyle/>
+                    <a:p>
+                      <a:pPr algn="ctr"/>
+                      <a:r>
+                        <a:rPr lang="fr-FR" sz="1000" dirty="0"/>
+                        <a:t>Nom</a:t>
+                      </a:r>
+                    </a:p>
+                  </a:txBody>
+                  <a:tcPr/>
+                </a:tc>
+                <a:tc>
+                  <a:txBody>
+                    <a:bodyPr/>
+                    <a:lstStyle/>
+                    <a:p>
+                      <a:pPr algn="ctr"/>
+                      <a:r>
+                        <a:rPr lang="fr-FR" sz="1000" dirty="0"/>
+                        <a:t>Type</a:t>
+                      </a:r>
+                    </a:p>
+                  </a:txBody>
+                  <a:tcPr/>
+                </a:tc>
+                <a:tc>
+                  <a:txBody>
+                    <a:bodyPr/>
+                    <a:lstStyle/>
+                    <a:p>
+                      <a:pPr algn="ctr"/>
+                      <a:r>
+                        <a:rPr lang="fr-FR" sz="1000" dirty="0"/>
+                        <a:t>PV</a:t>
+                      </a:r>
+                    </a:p>
+                  </a:txBody>
+                  <a:tcPr/>
+                </a:tc>
+                <a:tc>
+                  <a:txBody>
+                    <a:bodyPr/>
+                    <a:lstStyle/>
+                    <a:p>
+                      <a:pPr algn="ctr"/>
+                      <a:r>
+                        <a:rPr lang="fr-FR" sz="1000" dirty="0"/>
+                        <a:t>ATT</a:t>
+                      </a:r>
+                    </a:p>
+                  </a:txBody>
+                  <a:tcPr/>
+                </a:tc>
+                <a:tc>
+                  <a:txBody>
+                    <a:bodyPr/>
+                    <a:lstStyle/>
+                    <a:p>
+                      <a:pPr algn="ctr"/>
+                      <a:r>
+                        <a:rPr lang="fr-FR" sz="1000" dirty="0"/>
+                        <a:t>DEF</a:t>
+                      </a:r>
+                    </a:p>
+                  </a:txBody>
+                  <a:tcPr/>
+                </a:tc>
+                <a:tc>
+                  <a:txBody>
+                    <a:bodyPr/>
+                    <a:lstStyle/>
+                    <a:p>
+                      <a:pPr algn="ctr"/>
+                      <a:r>
+                        <a:rPr lang="fr-FR" sz="1000" dirty="0"/>
+                        <a:t>ATT SPE</a:t>
+                      </a:r>
+                    </a:p>
+                  </a:txBody>
+                  <a:tcPr/>
+                </a:tc>
+                <a:tc>
+                  <a:txBody>
+                    <a:bodyPr/>
+                    <a:lstStyle/>
+                    <a:p>
+                      <a:pPr algn="ctr"/>
+                      <a:r>
+                        <a:rPr lang="fr-FR" sz="1000" dirty="0"/>
+                        <a:t>DEF SPE</a:t>
+                      </a:r>
+                    </a:p>
+                  </a:txBody>
+                  <a:tcPr/>
+                </a:tc>
+                <a:tc>
+                  <a:txBody>
+                    <a:bodyPr/>
+                    <a:lstStyle/>
+                    <a:p>
+                      <a:pPr algn="ctr"/>
+                      <a:r>
+                        <a:rPr lang="fr-FR" sz="1000" dirty="0"/>
+                        <a:t>VITESSE</a:t>
+                      </a:r>
+                    </a:p>
+                  </a:txBody>
+                  <a:tcPr/>
+                </a:tc>
+                <a:tc>
+                  <a:txBody>
+                    <a:bodyPr/>
+                    <a:lstStyle/>
+                    <a:p>
+                      <a:pPr algn="ctr"/>
+                      <a:endParaRPr lang="fr-FR" sz="1000" dirty="0"/>
+                    </a:p>
+                  </a:txBody>
+                  <a:tcPr/>
+                </a:tc>
+                <a:tc>
+                  <a:txBody>
+                    <a:bodyPr/>
+                    <a:lstStyle/>
+                    <a:p>
+                      <a:pPr algn="ctr"/>
+                      <a:endParaRPr lang="fr-FR" sz="1000" dirty="0"/>
+                    </a:p>
+                  </a:txBody>
+                  <a:tcPr/>
+                </a:tc>
+                <a:tc>
+                  <a:txBody>
+                    <a:bodyPr/>
+                    <a:lstStyle/>
+                    <a:p>
+                      <a:pPr algn="ctr"/>
+                      <a:endParaRPr lang="fr-FR" sz="1000" dirty="0"/>
+                    </a:p>
+                  </a:txBody>
+                  <a:tcPr/>
+                </a:tc>
+                <a:tc>
+                  <a:txBody>
+                    <a:bodyPr/>
+                    <a:lstStyle/>
+                    <a:p>
+                      <a:pPr algn="ctr"/>
+                      <a:endParaRPr lang="fr-FR" sz="1000" dirty="0"/>
+                    </a:p>
+                  </a:txBody>
+                  <a:tcPr/>
+                </a:tc>
+                <a:extLst>
+                  <a:ext uri="{0D108BD9-81ED-4DB2-BD59-A6C34878D82A}">
+                    <a16:rowId xmlns:a16="http://schemas.microsoft.com/office/drawing/2014/main" val="1439004379"/>
+                  </a:ext>
+                </a:extLst>
+              </a:tr>
+              <a:tr h="330029">
+                <a:tc>
+                  <a:txBody>
+                    <a:bodyPr/>
+                    <a:lstStyle/>
+                    <a:p>
+                      <a:pPr algn="ctr"/>
+                      <a:r>
+                        <a:rPr lang="fr-FR" sz="1000" dirty="0" err="1"/>
+                        <a:t>Rémoraid</a:t>
+                      </a:r>
+                      <a:endParaRPr lang="fr-FR" sz="1000" dirty="0"/>
+                    </a:p>
+                  </a:txBody>
+                  <a:tcPr/>
+                </a:tc>
+                <a:tc>
+                  <a:txBody>
+                    <a:bodyPr/>
+                    <a:lstStyle/>
+                    <a:p>
+                      <a:pPr algn="ctr"/>
+                      <a:r>
+                        <a:rPr lang="fr-FR" sz="1000" dirty="0"/>
+                        <a:t>Eau</a:t>
+                      </a:r>
+                    </a:p>
+                  </a:txBody>
+                  <a:tcPr/>
+                </a:tc>
+                <a:tc>
+                  <a:txBody>
+                    <a:bodyPr/>
+                    <a:lstStyle/>
+                    <a:p>
+                      <a:pPr algn="ctr"/>
+                      <a:r>
+                        <a:rPr lang="fr-FR" sz="1000" dirty="0"/>
+                        <a:t>35</a:t>
+                      </a:r>
+                    </a:p>
+                  </a:txBody>
+                  <a:tcPr/>
+                </a:tc>
+                <a:tc>
+                  <a:txBody>
+                    <a:bodyPr/>
+                    <a:lstStyle/>
+                    <a:p>
+                      <a:pPr algn="ctr"/>
+                      <a:r>
+                        <a:rPr lang="fr-FR" sz="1000" dirty="0"/>
+                        <a:t>65</a:t>
+                      </a:r>
+                    </a:p>
+                  </a:txBody>
+                  <a:tcPr/>
+                </a:tc>
+                <a:tc>
+                  <a:txBody>
+                    <a:bodyPr/>
+                    <a:lstStyle/>
+                    <a:p>
+                      <a:pPr algn="ctr"/>
+                      <a:r>
+                        <a:rPr lang="fr-FR" sz="1000" dirty="0"/>
+                        <a:t>35</a:t>
+                      </a:r>
+                    </a:p>
+                  </a:txBody>
+                  <a:tcPr/>
+                </a:tc>
+                <a:tc>
+                  <a:txBody>
+                    <a:bodyPr/>
+                    <a:lstStyle/>
+                    <a:p>
+                      <a:pPr algn="ctr"/>
+                      <a:r>
+                        <a:rPr lang="fr-FR" sz="1000" dirty="0"/>
+                        <a:t>65</a:t>
+                      </a:r>
+                    </a:p>
+                  </a:txBody>
+                  <a:tcPr/>
+                </a:tc>
+                <a:tc>
+                  <a:txBody>
+                    <a:bodyPr/>
+                    <a:lstStyle/>
+                    <a:p>
+                      <a:pPr algn="ctr"/>
+                      <a:r>
+                        <a:rPr lang="fr-FR" sz="1000" dirty="0"/>
+                        <a:t>35</a:t>
+                      </a:r>
+                    </a:p>
+                  </a:txBody>
+                  <a:tcPr/>
+                </a:tc>
+                <a:tc>
+                  <a:txBody>
+                    <a:bodyPr/>
+                    <a:lstStyle/>
+                    <a:p>
+                      <a:pPr algn="ctr"/>
+                      <a:r>
+                        <a:rPr lang="fr-FR" sz="1000" dirty="0"/>
+                        <a:t>65</a:t>
+                      </a:r>
+                    </a:p>
+                  </a:txBody>
+                  <a:tcPr/>
+                </a:tc>
+                <a:tc>
+                  <a:txBody>
+                    <a:bodyPr/>
+                    <a:lstStyle/>
+                    <a:p>
+                      <a:pPr algn="ctr"/>
+                      <a:endParaRPr lang="fr-FR" sz="1000" dirty="0"/>
+                    </a:p>
+                  </a:txBody>
+                  <a:tcPr/>
+                </a:tc>
+                <a:tc>
+                  <a:txBody>
+                    <a:bodyPr/>
+                    <a:lstStyle/>
+                    <a:p>
+                      <a:pPr algn="ctr"/>
+                      <a:endParaRPr lang="fr-FR" sz="1000" dirty="0"/>
+                    </a:p>
+                  </a:txBody>
+                  <a:tcPr/>
+                </a:tc>
+                <a:tc>
+                  <a:txBody>
+                    <a:bodyPr/>
+                    <a:lstStyle/>
+                    <a:p>
+                      <a:pPr algn="ctr"/>
+                      <a:endParaRPr lang="fr-FR" sz="1000" dirty="0"/>
+                    </a:p>
+                  </a:txBody>
+                  <a:tcPr/>
+                </a:tc>
+                <a:tc>
+                  <a:txBody>
+                    <a:bodyPr/>
+                    <a:lstStyle/>
+                    <a:p>
+                      <a:pPr algn="ctr"/>
+                      <a:endParaRPr lang="fr-FR" sz="1000" dirty="0"/>
+                    </a:p>
+                  </a:txBody>
+                  <a:tcPr/>
+                </a:tc>
+                <a:extLst>
+                  <a:ext uri="{0D108BD9-81ED-4DB2-BD59-A6C34878D82A}">
+                    <a16:rowId xmlns:a16="http://schemas.microsoft.com/office/drawing/2014/main" val="3097686795"/>
+                  </a:ext>
+                </a:extLst>
+              </a:tr>
+              <a:tr h="309489">
+                <a:tc>
+                  <a:txBody>
+                    <a:bodyPr/>
+                    <a:lstStyle/>
+                    <a:p>
+                      <a:pPr algn="ctr"/>
+                      <a:r>
+                        <a:rPr lang="fr-FR" sz="1000" dirty="0"/>
+                        <a:t>Magicarpe</a:t>
+                      </a:r>
+                    </a:p>
+                  </a:txBody>
+                  <a:tcPr/>
+                </a:tc>
+                <a:tc>
+                  <a:txBody>
+                    <a:bodyPr/>
+                    <a:lstStyle/>
+                    <a:p>
+                      <a:pPr algn="ctr"/>
+                      <a:r>
+                        <a:rPr lang="fr-FR" sz="1000" dirty="0"/>
+                        <a:t>Eau</a:t>
+                      </a:r>
+                    </a:p>
+                  </a:txBody>
+                  <a:tcPr/>
+                </a:tc>
+                <a:tc>
+                  <a:txBody>
+                    <a:bodyPr/>
+                    <a:lstStyle/>
+                    <a:p>
+                      <a:pPr algn="ctr"/>
+                      <a:r>
+                        <a:rPr lang="fr-FR" sz="1000" dirty="0"/>
+                        <a:t>20</a:t>
+                      </a:r>
+                    </a:p>
+                  </a:txBody>
+                  <a:tcPr/>
+                </a:tc>
+                <a:tc>
+                  <a:txBody>
+                    <a:bodyPr/>
+                    <a:lstStyle/>
+                    <a:p>
+                      <a:pPr algn="ctr"/>
+                      <a:r>
+                        <a:rPr lang="fr-FR" sz="1000" dirty="0"/>
+                        <a:t>10</a:t>
+                      </a:r>
+                    </a:p>
+                  </a:txBody>
+                  <a:tcPr/>
+                </a:tc>
+                <a:tc>
+                  <a:txBody>
+                    <a:bodyPr/>
+                    <a:lstStyle/>
+                    <a:p>
+                      <a:pPr algn="ctr"/>
+                      <a:r>
+                        <a:rPr lang="fr-FR" sz="1000" dirty="0"/>
+                        <a:t>55</a:t>
+                      </a:r>
+                    </a:p>
+                  </a:txBody>
+                  <a:tcPr/>
+                </a:tc>
+                <a:tc>
+                  <a:txBody>
+                    <a:bodyPr/>
+                    <a:lstStyle/>
+                    <a:p>
+                      <a:pPr algn="ctr"/>
+                      <a:r>
+                        <a:rPr lang="fr-FR" sz="1000" dirty="0"/>
+                        <a:t>15</a:t>
+                      </a:r>
+                    </a:p>
+                  </a:txBody>
+                  <a:tcPr/>
+                </a:tc>
+                <a:tc>
+                  <a:txBody>
+                    <a:bodyPr/>
+                    <a:lstStyle/>
+                    <a:p>
+                      <a:pPr algn="ctr"/>
+                      <a:r>
+                        <a:rPr lang="fr-FR" sz="1000" dirty="0"/>
+                        <a:t>20</a:t>
+                      </a:r>
+                    </a:p>
+                  </a:txBody>
+                  <a:tcPr/>
+                </a:tc>
+                <a:tc>
+                  <a:txBody>
+                    <a:bodyPr/>
+                    <a:lstStyle/>
+                    <a:p>
+                      <a:pPr algn="ctr"/>
+                      <a:r>
+                        <a:rPr lang="fr-FR" sz="1000" dirty="0"/>
+                        <a:t>80</a:t>
+                      </a:r>
+                    </a:p>
+                  </a:txBody>
+                  <a:tcPr/>
+                </a:tc>
+                <a:tc>
+                  <a:txBody>
+                    <a:bodyPr/>
+                    <a:lstStyle/>
+                    <a:p>
+                      <a:pPr algn="ctr"/>
+                      <a:endParaRPr lang="fr-FR" sz="1000" dirty="0"/>
+                    </a:p>
+                  </a:txBody>
+                  <a:tcPr/>
+                </a:tc>
+                <a:tc>
+                  <a:txBody>
+                    <a:bodyPr/>
+                    <a:lstStyle/>
+                    <a:p>
+                      <a:pPr algn="ctr"/>
+                      <a:endParaRPr lang="fr-FR" sz="1000" dirty="0"/>
+                    </a:p>
+                  </a:txBody>
+                  <a:tcPr/>
+                </a:tc>
+                <a:tc>
+                  <a:txBody>
+                    <a:bodyPr/>
+                    <a:lstStyle/>
+                    <a:p>
+                      <a:pPr algn="ctr"/>
+                      <a:endParaRPr lang="fr-FR" sz="1000" dirty="0"/>
+                    </a:p>
+                  </a:txBody>
+                  <a:tcPr/>
+                </a:tc>
+                <a:tc>
+                  <a:txBody>
+                    <a:bodyPr/>
+                    <a:lstStyle/>
+                    <a:p>
+                      <a:pPr algn="ctr"/>
+                      <a:endParaRPr lang="fr-FR" sz="1000" dirty="0"/>
+                    </a:p>
+                  </a:txBody>
+                  <a:tcPr/>
+                </a:tc>
+                <a:extLst>
+                  <a:ext uri="{0D108BD9-81ED-4DB2-BD59-A6C34878D82A}">
+                    <a16:rowId xmlns:a16="http://schemas.microsoft.com/office/drawing/2014/main" val="402988641"/>
+                  </a:ext>
+                </a:extLst>
+              </a:tr>
+              <a:tr h="407963">
+                <a:tc>
+                  <a:txBody>
+                    <a:bodyPr/>
+                    <a:lstStyle/>
+                    <a:p>
+                      <a:pPr algn="ctr"/>
+                      <a:r>
+                        <a:rPr lang="fr-FR" sz="1000" dirty="0"/>
+                        <a:t>Sulfura</a:t>
+                      </a:r>
+                    </a:p>
+                  </a:txBody>
+                  <a:tcPr/>
+                </a:tc>
+                <a:tc>
+                  <a:txBody>
+                    <a:bodyPr/>
+                    <a:lstStyle/>
+                    <a:p>
+                      <a:pPr algn="ctr"/>
+                      <a:r>
+                        <a:rPr lang="fr-FR" sz="1000" dirty="0"/>
+                        <a:t>Feu</a:t>
+                      </a:r>
+                    </a:p>
+                  </a:txBody>
+                  <a:tcPr/>
+                </a:tc>
+                <a:tc>
+                  <a:txBody>
+                    <a:bodyPr/>
+                    <a:lstStyle/>
+                    <a:p>
+                      <a:pPr algn="ctr"/>
+                      <a:r>
+                        <a:rPr lang="fr-FR" sz="1000" dirty="0"/>
+                        <a:t>90</a:t>
+                      </a:r>
+                    </a:p>
+                  </a:txBody>
+                  <a:tcPr/>
+                </a:tc>
+                <a:tc>
+                  <a:txBody>
+                    <a:bodyPr/>
+                    <a:lstStyle/>
+                    <a:p>
+                      <a:pPr algn="ctr"/>
+                      <a:r>
+                        <a:rPr lang="fr-FR" sz="1000" dirty="0"/>
+                        <a:t>100</a:t>
+                      </a:r>
+                    </a:p>
+                  </a:txBody>
+                  <a:tcPr/>
+                </a:tc>
+                <a:tc>
+                  <a:txBody>
+                    <a:bodyPr/>
+                    <a:lstStyle/>
+                    <a:p>
+                      <a:pPr algn="ctr"/>
+                      <a:r>
+                        <a:rPr lang="fr-FR" sz="1000" dirty="0"/>
+                        <a:t>90</a:t>
+                      </a:r>
+                    </a:p>
+                  </a:txBody>
+                  <a:tcPr/>
+                </a:tc>
+                <a:tc>
+                  <a:txBody>
+                    <a:bodyPr/>
+                    <a:lstStyle/>
+                    <a:p>
+                      <a:pPr algn="ctr"/>
+                      <a:r>
+                        <a:rPr lang="fr-FR" sz="1000" dirty="0"/>
+                        <a:t>125</a:t>
+                      </a:r>
+                    </a:p>
+                  </a:txBody>
+                  <a:tcPr/>
+                </a:tc>
+                <a:tc>
+                  <a:txBody>
+                    <a:bodyPr/>
+                    <a:lstStyle/>
+                    <a:p>
+                      <a:pPr algn="ctr"/>
+                      <a:r>
+                        <a:rPr lang="fr-FR" sz="1000" dirty="0"/>
+                        <a:t>85</a:t>
+                      </a:r>
+                    </a:p>
+                  </a:txBody>
+                  <a:tcPr/>
+                </a:tc>
+                <a:tc>
+                  <a:txBody>
+                    <a:bodyPr/>
+                    <a:lstStyle/>
+                    <a:p>
+                      <a:pPr algn="ctr"/>
+                      <a:r>
+                        <a:rPr lang="fr-FR" sz="1000" dirty="0"/>
+                        <a:t>90</a:t>
+                      </a:r>
+                    </a:p>
+                  </a:txBody>
+                  <a:tcPr/>
+                </a:tc>
+                <a:tc>
+                  <a:txBody>
+                    <a:bodyPr/>
+                    <a:lstStyle/>
+                    <a:p>
+                      <a:pPr algn="ctr"/>
+                      <a:endParaRPr lang="fr-FR" sz="1000" dirty="0"/>
+                    </a:p>
+                  </a:txBody>
+                  <a:tcPr/>
+                </a:tc>
+                <a:tc>
+                  <a:txBody>
+                    <a:bodyPr/>
+                    <a:lstStyle/>
+                    <a:p>
+                      <a:pPr algn="ctr"/>
+                      <a:endParaRPr lang="fr-FR" sz="1000" dirty="0"/>
+                    </a:p>
+                  </a:txBody>
+                  <a:tcPr/>
+                </a:tc>
+                <a:tc>
+                  <a:txBody>
+                    <a:bodyPr/>
+                    <a:lstStyle/>
+                    <a:p>
+                      <a:pPr algn="ctr"/>
+                      <a:endParaRPr lang="fr-FR" sz="1000" dirty="0"/>
+                    </a:p>
+                  </a:txBody>
+                  <a:tcPr/>
+                </a:tc>
+                <a:tc>
+                  <a:txBody>
+                    <a:bodyPr/>
+                    <a:lstStyle/>
+                    <a:p>
+                      <a:pPr algn="ctr"/>
+                      <a:endParaRPr lang="fr-FR" sz="1000" dirty="0"/>
+                    </a:p>
+                  </a:txBody>
+                  <a:tcPr/>
+                </a:tc>
+                <a:extLst>
+                  <a:ext uri="{0D108BD9-81ED-4DB2-BD59-A6C34878D82A}">
+                    <a16:rowId xmlns:a16="http://schemas.microsoft.com/office/drawing/2014/main" val="2790993927"/>
+                  </a:ext>
+                </a:extLst>
+              </a:tr>
+              <a:tr h="393896">
+                <a:tc>
+                  <a:txBody>
+                    <a:bodyPr/>
+                    <a:lstStyle/>
+                    <a:p>
+                      <a:pPr algn="ctr"/>
+                      <a:r>
+                        <a:rPr lang="fr-FR" sz="1000" dirty="0" err="1"/>
+                        <a:t>Reshiram</a:t>
+                      </a:r>
+                      <a:endParaRPr lang="fr-FR" sz="1000" dirty="0"/>
+                    </a:p>
+                  </a:txBody>
+                  <a:tcPr/>
+                </a:tc>
+                <a:tc>
+                  <a:txBody>
+                    <a:bodyPr/>
+                    <a:lstStyle/>
+                    <a:p>
+                      <a:pPr algn="ctr"/>
+                      <a:r>
+                        <a:rPr lang="fr-FR" sz="1000" dirty="0"/>
+                        <a:t>Feu</a:t>
+                      </a:r>
+                    </a:p>
+                  </a:txBody>
+                  <a:tcPr/>
+                </a:tc>
+                <a:tc>
+                  <a:txBody>
+                    <a:bodyPr/>
+                    <a:lstStyle/>
+                    <a:p>
+                      <a:pPr algn="ctr"/>
+                      <a:r>
+                        <a:rPr lang="fr-FR" sz="1000" dirty="0"/>
+                        <a:t>100</a:t>
+                      </a:r>
+                    </a:p>
+                  </a:txBody>
+                  <a:tcPr/>
+                </a:tc>
+                <a:tc>
+                  <a:txBody>
+                    <a:bodyPr/>
+                    <a:lstStyle/>
+                    <a:p>
+                      <a:pPr algn="ctr"/>
+                      <a:r>
+                        <a:rPr lang="fr-FR" sz="1000" dirty="0"/>
+                        <a:t>120</a:t>
+                      </a:r>
+                    </a:p>
+                  </a:txBody>
+                  <a:tcPr/>
+                </a:tc>
+                <a:tc>
+                  <a:txBody>
+                    <a:bodyPr/>
+                    <a:lstStyle/>
+                    <a:p>
+                      <a:pPr algn="ctr"/>
+                      <a:r>
+                        <a:rPr lang="fr-FR" sz="1000" dirty="0"/>
+                        <a:t>100</a:t>
+                      </a:r>
+                    </a:p>
+                  </a:txBody>
+                  <a:tcPr/>
+                </a:tc>
+                <a:tc>
+                  <a:txBody>
+                    <a:bodyPr/>
+                    <a:lstStyle/>
+                    <a:p>
+                      <a:pPr algn="ctr"/>
+                      <a:r>
+                        <a:rPr lang="fr-FR" sz="1000" dirty="0"/>
+                        <a:t>150</a:t>
+                      </a:r>
+                    </a:p>
+                  </a:txBody>
+                  <a:tcPr/>
+                </a:tc>
+                <a:tc>
+                  <a:txBody>
+                    <a:bodyPr/>
+                    <a:lstStyle/>
+                    <a:p>
+                      <a:pPr algn="ctr"/>
+                      <a:r>
+                        <a:rPr lang="fr-FR" sz="1000" dirty="0"/>
+                        <a:t>120</a:t>
+                      </a:r>
+                    </a:p>
+                  </a:txBody>
+                  <a:tcPr/>
+                </a:tc>
+                <a:tc>
+                  <a:txBody>
+                    <a:bodyPr/>
+                    <a:lstStyle/>
+                    <a:p>
+                      <a:pPr algn="ctr"/>
+                      <a:r>
+                        <a:rPr lang="fr-FR" sz="1000" dirty="0"/>
+                        <a:t>90</a:t>
+                      </a:r>
+                    </a:p>
+                  </a:txBody>
+                  <a:tcPr/>
+                </a:tc>
+                <a:tc>
+                  <a:txBody>
+                    <a:bodyPr/>
+                    <a:lstStyle/>
+                    <a:p>
+                      <a:pPr algn="ctr"/>
+                      <a:endParaRPr lang="fr-FR" sz="1000" dirty="0"/>
+                    </a:p>
+                  </a:txBody>
+                  <a:tcPr/>
+                </a:tc>
+                <a:tc>
+                  <a:txBody>
+                    <a:bodyPr/>
+                    <a:lstStyle/>
+                    <a:p>
+                      <a:pPr algn="ctr"/>
+                      <a:endParaRPr lang="fr-FR" sz="1000" dirty="0"/>
+                    </a:p>
+                  </a:txBody>
+                  <a:tcPr/>
+                </a:tc>
+                <a:tc>
+                  <a:txBody>
+                    <a:bodyPr/>
+                    <a:lstStyle/>
+                    <a:p>
+                      <a:pPr algn="ctr"/>
+                      <a:endParaRPr lang="fr-FR" sz="1000" dirty="0"/>
+                    </a:p>
+                  </a:txBody>
+                  <a:tcPr/>
+                </a:tc>
+                <a:tc>
+                  <a:txBody>
+                    <a:bodyPr/>
+                    <a:lstStyle/>
+                    <a:p>
+                      <a:pPr algn="ctr"/>
+                      <a:endParaRPr lang="fr-FR" sz="1000" dirty="0"/>
+                    </a:p>
+                  </a:txBody>
+                  <a:tcPr/>
+                </a:tc>
+                <a:extLst>
+                  <a:ext uri="{0D108BD9-81ED-4DB2-BD59-A6C34878D82A}">
+                    <a16:rowId xmlns:a16="http://schemas.microsoft.com/office/drawing/2014/main" val="1013587500"/>
+                  </a:ext>
+                </a:extLst>
+              </a:tr>
+              <a:tr h="379827">
+                <a:tc>
+                  <a:txBody>
+                    <a:bodyPr/>
+                    <a:lstStyle/>
+                    <a:p>
+                      <a:pPr algn="ctr"/>
+                      <a:r>
+                        <a:rPr lang="fr-FR" sz="1000" dirty="0" err="1"/>
+                        <a:t>Rhinocorne</a:t>
+                      </a:r>
+                      <a:endParaRPr lang="fr-FR" sz="1000" dirty="0"/>
+                    </a:p>
+                  </a:txBody>
+                  <a:tcPr/>
+                </a:tc>
+                <a:tc>
+                  <a:txBody>
+                    <a:bodyPr/>
+                    <a:lstStyle/>
+                    <a:p>
+                      <a:pPr algn="ctr"/>
+                      <a:r>
+                        <a:rPr lang="fr-FR" sz="1000" dirty="0"/>
+                        <a:t>Roche</a:t>
+                      </a:r>
+                    </a:p>
+                  </a:txBody>
+                  <a:tcPr/>
+                </a:tc>
+                <a:tc>
+                  <a:txBody>
+                    <a:bodyPr/>
+                    <a:lstStyle/>
+                    <a:p>
+                      <a:pPr algn="ctr"/>
+                      <a:r>
+                        <a:rPr lang="fr-FR" sz="1000" dirty="0"/>
+                        <a:t>80</a:t>
+                      </a:r>
+                    </a:p>
+                  </a:txBody>
+                  <a:tcPr/>
+                </a:tc>
+                <a:tc>
+                  <a:txBody>
+                    <a:bodyPr/>
+                    <a:lstStyle/>
+                    <a:p>
+                      <a:pPr algn="ctr"/>
+                      <a:r>
+                        <a:rPr lang="fr-FR" sz="1000" dirty="0"/>
+                        <a:t>85</a:t>
+                      </a:r>
+                    </a:p>
+                  </a:txBody>
+                  <a:tcPr/>
+                </a:tc>
+                <a:tc>
+                  <a:txBody>
+                    <a:bodyPr/>
+                    <a:lstStyle/>
+                    <a:p>
+                      <a:pPr algn="ctr"/>
+                      <a:r>
+                        <a:rPr lang="fr-FR" sz="1000" dirty="0"/>
+                        <a:t>95</a:t>
+                      </a:r>
+                    </a:p>
+                  </a:txBody>
+                  <a:tcPr/>
+                </a:tc>
+                <a:tc>
+                  <a:txBody>
+                    <a:bodyPr/>
+                    <a:lstStyle/>
+                    <a:p>
+                      <a:pPr algn="ctr"/>
+                      <a:r>
+                        <a:rPr lang="fr-FR" sz="1000" dirty="0"/>
+                        <a:t>30</a:t>
+                      </a:r>
+                    </a:p>
+                  </a:txBody>
+                  <a:tcPr/>
+                </a:tc>
+                <a:tc>
+                  <a:txBody>
+                    <a:bodyPr/>
+                    <a:lstStyle/>
+                    <a:p>
+                      <a:pPr algn="ctr"/>
+                      <a:r>
+                        <a:rPr lang="fr-FR" sz="1000" dirty="0"/>
+                        <a:t>30</a:t>
+                      </a:r>
+                    </a:p>
+                  </a:txBody>
+                  <a:tcPr/>
+                </a:tc>
+                <a:tc>
+                  <a:txBody>
+                    <a:bodyPr/>
+                    <a:lstStyle/>
+                    <a:p>
+                      <a:pPr algn="ctr"/>
+                      <a:r>
+                        <a:rPr lang="fr-FR" sz="1000" dirty="0"/>
+                        <a:t>25</a:t>
+                      </a:r>
+                    </a:p>
+                  </a:txBody>
+                  <a:tcPr/>
+                </a:tc>
+                <a:tc>
+                  <a:txBody>
+                    <a:bodyPr/>
+                    <a:lstStyle/>
+                    <a:p>
+                      <a:pPr algn="ctr"/>
+                      <a:endParaRPr lang="fr-FR" sz="1000" dirty="0"/>
+                    </a:p>
+                  </a:txBody>
+                  <a:tcPr/>
+                </a:tc>
+                <a:tc>
+                  <a:txBody>
+                    <a:bodyPr/>
+                    <a:lstStyle/>
+                    <a:p>
+                      <a:pPr algn="ctr"/>
+                      <a:endParaRPr lang="fr-FR" sz="1000" dirty="0"/>
+                    </a:p>
+                  </a:txBody>
+                  <a:tcPr/>
+                </a:tc>
+                <a:tc>
+                  <a:txBody>
+                    <a:bodyPr/>
+                    <a:lstStyle/>
+                    <a:p>
+                      <a:pPr algn="ctr"/>
+                      <a:endParaRPr lang="fr-FR" sz="1000" dirty="0"/>
+                    </a:p>
+                  </a:txBody>
+                  <a:tcPr/>
+                </a:tc>
+                <a:tc>
+                  <a:txBody>
+                    <a:bodyPr/>
+                    <a:lstStyle/>
+                    <a:p>
+                      <a:pPr algn="ctr"/>
+                      <a:endParaRPr lang="fr-FR" sz="1000" dirty="0"/>
+                    </a:p>
+                  </a:txBody>
+                  <a:tcPr/>
+                </a:tc>
+                <a:extLst>
+                  <a:ext uri="{0D108BD9-81ED-4DB2-BD59-A6C34878D82A}">
+                    <a16:rowId xmlns:a16="http://schemas.microsoft.com/office/drawing/2014/main" val="1547638070"/>
+                  </a:ext>
+                </a:extLst>
+              </a:tr>
+              <a:tr h="422031">
+                <a:tc>
+                  <a:txBody>
+                    <a:bodyPr/>
+                    <a:lstStyle/>
+                    <a:p>
+                      <a:pPr algn="ctr"/>
+                      <a:r>
+                        <a:rPr lang="fr-FR" sz="1000" dirty="0" err="1"/>
+                        <a:t>Diancie</a:t>
+                      </a:r>
+                      <a:endParaRPr lang="fr-FR" sz="1000" dirty="0"/>
+                    </a:p>
+                  </a:txBody>
+                  <a:tcPr/>
+                </a:tc>
+                <a:tc>
+                  <a:txBody>
+                    <a:bodyPr/>
+                    <a:lstStyle/>
+                    <a:p>
+                      <a:pPr algn="ctr"/>
+                      <a:r>
+                        <a:rPr lang="fr-FR" sz="1000" dirty="0"/>
+                        <a:t>Roche</a:t>
+                      </a:r>
+                    </a:p>
+                  </a:txBody>
+                  <a:tcPr/>
+                </a:tc>
+                <a:tc>
+                  <a:txBody>
+                    <a:bodyPr/>
+                    <a:lstStyle/>
+                    <a:p>
+                      <a:pPr algn="ctr"/>
+                      <a:r>
+                        <a:rPr lang="fr-FR" sz="1000" dirty="0"/>
+                        <a:t>50</a:t>
+                      </a:r>
+                    </a:p>
+                  </a:txBody>
+                  <a:tcPr/>
+                </a:tc>
+                <a:tc>
+                  <a:txBody>
+                    <a:bodyPr/>
+                    <a:lstStyle/>
+                    <a:p>
+                      <a:pPr algn="ctr"/>
+                      <a:r>
+                        <a:rPr lang="fr-FR" sz="1000" dirty="0"/>
+                        <a:t>100</a:t>
+                      </a:r>
+                    </a:p>
+                  </a:txBody>
+                  <a:tcPr/>
+                </a:tc>
+                <a:tc>
+                  <a:txBody>
+                    <a:bodyPr/>
+                    <a:lstStyle/>
+                    <a:p>
+                      <a:pPr algn="ctr"/>
+                      <a:r>
+                        <a:rPr lang="fr-FR" sz="1000" dirty="0"/>
+                        <a:t>150</a:t>
+                      </a:r>
+                    </a:p>
+                  </a:txBody>
+                  <a:tcPr/>
+                </a:tc>
+                <a:tc>
+                  <a:txBody>
+                    <a:bodyPr/>
+                    <a:lstStyle/>
+                    <a:p>
+                      <a:pPr algn="ctr"/>
+                      <a:r>
+                        <a:rPr lang="fr-FR" sz="1000" dirty="0"/>
+                        <a:t>100</a:t>
+                      </a:r>
+                    </a:p>
+                  </a:txBody>
+                  <a:tcPr/>
+                </a:tc>
+                <a:tc>
+                  <a:txBody>
+                    <a:bodyPr/>
+                    <a:lstStyle/>
+                    <a:p>
+                      <a:pPr algn="ctr"/>
+                      <a:r>
+                        <a:rPr lang="fr-FR" sz="1000" dirty="0"/>
+                        <a:t>150</a:t>
+                      </a:r>
+                    </a:p>
+                  </a:txBody>
+                  <a:tcPr/>
+                </a:tc>
+                <a:tc>
+                  <a:txBody>
+                    <a:bodyPr/>
+                    <a:lstStyle/>
+                    <a:p>
+                      <a:pPr algn="ctr"/>
+                      <a:r>
+                        <a:rPr lang="fr-FR" sz="1000" dirty="0"/>
+                        <a:t>50</a:t>
+                      </a:r>
+                    </a:p>
+                  </a:txBody>
+                  <a:tcPr/>
+                </a:tc>
+                <a:tc>
+                  <a:txBody>
+                    <a:bodyPr/>
+                    <a:lstStyle/>
+                    <a:p>
+                      <a:pPr algn="ctr"/>
+                      <a:endParaRPr lang="fr-FR" sz="1000" dirty="0"/>
+                    </a:p>
+                  </a:txBody>
+                  <a:tcPr/>
+                </a:tc>
+                <a:tc>
+                  <a:txBody>
+                    <a:bodyPr/>
+                    <a:lstStyle/>
+                    <a:p>
+                      <a:pPr algn="ctr"/>
+                      <a:endParaRPr lang="fr-FR" sz="1000" dirty="0"/>
+                    </a:p>
+                  </a:txBody>
+                  <a:tcPr/>
+                </a:tc>
+                <a:tc>
+                  <a:txBody>
+                    <a:bodyPr/>
+                    <a:lstStyle/>
+                    <a:p>
+                      <a:pPr algn="ctr"/>
+                      <a:endParaRPr lang="fr-FR" sz="1000" dirty="0"/>
+                    </a:p>
+                  </a:txBody>
+                  <a:tcPr/>
+                </a:tc>
+                <a:tc>
+                  <a:txBody>
+                    <a:bodyPr/>
+                    <a:lstStyle/>
+                    <a:p>
+                      <a:pPr algn="ctr"/>
+                      <a:endParaRPr lang="fr-FR" sz="1000" dirty="0"/>
+                    </a:p>
+                  </a:txBody>
+                  <a:tcPr/>
+                </a:tc>
+                <a:extLst>
+                  <a:ext uri="{0D108BD9-81ED-4DB2-BD59-A6C34878D82A}">
+                    <a16:rowId xmlns:a16="http://schemas.microsoft.com/office/drawing/2014/main" val="4020024340"/>
+                  </a:ext>
+                </a:extLst>
+              </a:tr>
+              <a:tr h="422031">
+                <a:tc>
+                  <a:txBody>
+                    <a:bodyPr/>
+                    <a:lstStyle/>
+                    <a:p>
+                      <a:pPr algn="ctr"/>
+                      <a:r>
+                        <a:rPr lang="fr-FR" sz="1000" dirty="0" err="1"/>
+                        <a:t>Bourrinos</a:t>
+                      </a:r>
+                      <a:endParaRPr lang="fr-FR" sz="1000" dirty="0"/>
+                    </a:p>
+                  </a:txBody>
+                  <a:tcPr/>
+                </a:tc>
+                <a:tc>
+                  <a:txBody>
+                    <a:bodyPr/>
+                    <a:lstStyle/>
+                    <a:p>
+                      <a:pPr algn="ctr"/>
+                      <a:r>
+                        <a:rPr lang="fr-FR" sz="1000" dirty="0"/>
+                        <a:t>Sol</a:t>
+                      </a:r>
+                    </a:p>
+                  </a:txBody>
+                  <a:tcPr/>
+                </a:tc>
+                <a:tc>
+                  <a:txBody>
+                    <a:bodyPr/>
+                    <a:lstStyle/>
+                    <a:p>
+                      <a:pPr algn="ctr"/>
+                      <a:r>
+                        <a:rPr lang="fr-FR" sz="1000" dirty="0"/>
+                        <a:t>100</a:t>
+                      </a:r>
+                    </a:p>
+                  </a:txBody>
+                  <a:tcPr/>
+                </a:tc>
+                <a:tc>
+                  <a:txBody>
+                    <a:bodyPr/>
+                    <a:lstStyle/>
+                    <a:p>
+                      <a:pPr algn="ctr"/>
+                      <a:r>
+                        <a:rPr lang="fr-FR" sz="1000" dirty="0"/>
+                        <a:t>125</a:t>
+                      </a:r>
+                    </a:p>
+                  </a:txBody>
+                  <a:tcPr/>
+                </a:tc>
+                <a:tc>
+                  <a:txBody>
+                    <a:bodyPr/>
+                    <a:lstStyle/>
+                    <a:p>
+                      <a:pPr algn="ctr"/>
+                      <a:r>
+                        <a:rPr lang="fr-FR" sz="1000" dirty="0"/>
+                        <a:t>100</a:t>
+                      </a:r>
+                    </a:p>
+                  </a:txBody>
+                  <a:tcPr/>
+                </a:tc>
+                <a:tc>
+                  <a:txBody>
+                    <a:bodyPr/>
+                    <a:lstStyle/>
+                    <a:p>
+                      <a:pPr algn="ctr"/>
+                      <a:r>
+                        <a:rPr lang="fr-FR" sz="1000" dirty="0"/>
+                        <a:t>55</a:t>
+                      </a:r>
+                    </a:p>
+                  </a:txBody>
+                  <a:tcPr/>
+                </a:tc>
+                <a:tc>
+                  <a:txBody>
+                    <a:bodyPr/>
+                    <a:lstStyle/>
+                    <a:p>
+                      <a:pPr algn="ctr"/>
+                      <a:r>
+                        <a:rPr lang="fr-FR" sz="1000" dirty="0"/>
+                        <a:t>85</a:t>
+                      </a:r>
+                    </a:p>
+                  </a:txBody>
+                  <a:tcPr/>
+                </a:tc>
+                <a:tc>
+                  <a:txBody>
+                    <a:bodyPr/>
+                    <a:lstStyle/>
+                    <a:p>
+                      <a:pPr algn="ctr"/>
+                      <a:r>
+                        <a:rPr lang="fr-FR" sz="1000" dirty="0"/>
+                        <a:t>35</a:t>
+                      </a:r>
+                    </a:p>
+                  </a:txBody>
+                  <a:tcPr/>
+                </a:tc>
+                <a:tc>
+                  <a:txBody>
+                    <a:bodyPr/>
+                    <a:lstStyle/>
+                    <a:p>
+                      <a:pPr algn="ctr"/>
+                      <a:endParaRPr lang="fr-FR" sz="1000" dirty="0"/>
+                    </a:p>
+                  </a:txBody>
+                  <a:tcPr/>
+                </a:tc>
+                <a:tc>
+                  <a:txBody>
+                    <a:bodyPr/>
+                    <a:lstStyle/>
+                    <a:p>
+                      <a:pPr algn="ctr"/>
+                      <a:endParaRPr lang="fr-FR" sz="1000" dirty="0"/>
+                    </a:p>
+                  </a:txBody>
+                  <a:tcPr/>
+                </a:tc>
+                <a:tc>
+                  <a:txBody>
+                    <a:bodyPr/>
+                    <a:lstStyle/>
+                    <a:p>
+                      <a:pPr algn="ctr"/>
+                      <a:endParaRPr lang="fr-FR" sz="1000" dirty="0"/>
+                    </a:p>
+                  </a:txBody>
+                  <a:tcPr/>
+                </a:tc>
+                <a:tc>
+                  <a:txBody>
+                    <a:bodyPr/>
+                    <a:lstStyle/>
+                    <a:p>
+                      <a:pPr algn="ctr"/>
+                      <a:endParaRPr lang="fr-FR" sz="1000" dirty="0"/>
+                    </a:p>
+                  </a:txBody>
+                  <a:tcPr/>
+                </a:tc>
+                <a:extLst>
+                  <a:ext uri="{0D108BD9-81ED-4DB2-BD59-A6C34878D82A}">
+                    <a16:rowId xmlns:a16="http://schemas.microsoft.com/office/drawing/2014/main" val="2871009961"/>
+                  </a:ext>
+                </a:extLst>
+              </a:tr>
+              <a:tr h="1121616">
+                <a:tc>
+                  <a:txBody>
+                    <a:bodyPr/>
+                    <a:lstStyle/>
+                    <a:p>
+                      <a:pPr algn="ctr"/>
+                      <a:r>
+                        <a:rPr lang="fr-FR" sz="1000" dirty="0" err="1"/>
+                        <a:t>Minotaupe</a:t>
+                      </a:r>
+                      <a:endParaRPr lang="fr-FR" sz="1000" dirty="0"/>
+                    </a:p>
+                  </a:txBody>
+                  <a:tcPr/>
+                </a:tc>
+                <a:tc>
+                  <a:txBody>
+                    <a:bodyPr/>
+                    <a:lstStyle/>
+                    <a:p>
+                      <a:pPr algn="ctr"/>
+                      <a:r>
+                        <a:rPr lang="fr-FR" sz="1000" dirty="0"/>
+                        <a:t>Sol</a:t>
+                      </a:r>
+                    </a:p>
+                  </a:txBody>
+                  <a:tcPr/>
+                </a:tc>
+                <a:tc>
+                  <a:txBody>
+                    <a:bodyPr/>
+                    <a:lstStyle/>
+                    <a:p>
+                      <a:pPr algn="ctr"/>
+                      <a:r>
+                        <a:rPr lang="fr-FR" sz="1000" dirty="0"/>
+                        <a:t>110</a:t>
+                      </a:r>
+                    </a:p>
+                  </a:txBody>
+                  <a:tcPr/>
+                </a:tc>
+                <a:tc>
+                  <a:txBody>
+                    <a:bodyPr/>
+                    <a:lstStyle/>
+                    <a:p>
+                      <a:pPr algn="ctr"/>
+                      <a:r>
+                        <a:rPr lang="fr-FR" sz="1000" dirty="0"/>
+                        <a:t>135</a:t>
+                      </a:r>
+                    </a:p>
+                  </a:txBody>
+                  <a:tcPr/>
+                </a:tc>
+                <a:tc>
+                  <a:txBody>
+                    <a:bodyPr/>
+                    <a:lstStyle/>
+                    <a:p>
+                      <a:pPr algn="ctr"/>
+                      <a:r>
+                        <a:rPr lang="fr-FR" sz="1000" dirty="0"/>
+                        <a:t>60</a:t>
+                      </a:r>
+                    </a:p>
+                  </a:txBody>
+                  <a:tcPr/>
+                </a:tc>
+                <a:tc>
+                  <a:txBody>
+                    <a:bodyPr/>
+                    <a:lstStyle/>
+                    <a:p>
+                      <a:pPr algn="ctr"/>
+                      <a:r>
+                        <a:rPr lang="fr-FR" sz="1000" dirty="0"/>
+                        <a:t>50</a:t>
+                      </a:r>
+                    </a:p>
+                  </a:txBody>
+                  <a:tcPr/>
+                </a:tc>
+                <a:tc>
+                  <a:txBody>
+                    <a:bodyPr/>
+                    <a:lstStyle/>
+                    <a:p>
+                      <a:pPr algn="ctr"/>
+                      <a:r>
+                        <a:rPr lang="fr-FR" sz="1000" dirty="0"/>
+                        <a:t>65</a:t>
+                      </a:r>
+                    </a:p>
+                  </a:txBody>
+                  <a:tcPr/>
+                </a:tc>
+                <a:tc>
+                  <a:txBody>
+                    <a:bodyPr/>
+                    <a:lstStyle/>
+                    <a:p>
+                      <a:pPr algn="ctr"/>
+                      <a:r>
+                        <a:rPr lang="fr-FR" sz="1000" dirty="0"/>
+                        <a:t>88</a:t>
+                      </a:r>
+                    </a:p>
+                  </a:txBody>
+                  <a:tcPr/>
+                </a:tc>
+                <a:tc>
+                  <a:txBody>
+                    <a:bodyPr/>
+                    <a:lstStyle/>
+                    <a:p>
+                      <a:pPr algn="ctr"/>
+                      <a:endParaRPr lang="fr-FR" sz="1000" dirty="0"/>
+                    </a:p>
+                  </a:txBody>
+                  <a:tcPr/>
+                </a:tc>
+                <a:tc>
+                  <a:txBody>
+                    <a:bodyPr/>
+                    <a:lstStyle/>
+                    <a:p>
+                      <a:pPr algn="ctr"/>
+                      <a:endParaRPr lang="fr-FR" sz="1000" dirty="0"/>
+                    </a:p>
+                  </a:txBody>
+                  <a:tcPr/>
+                </a:tc>
+                <a:tc>
+                  <a:txBody>
+                    <a:bodyPr/>
+                    <a:lstStyle/>
+                    <a:p>
+                      <a:pPr algn="ctr"/>
+                      <a:endParaRPr lang="fr-FR" sz="1000" dirty="0"/>
+                    </a:p>
+                  </a:txBody>
+                  <a:tcPr/>
+                </a:tc>
+                <a:tc>
+                  <a:txBody>
+                    <a:bodyPr/>
+                    <a:lstStyle/>
+                    <a:p>
+                      <a:pPr algn="ctr"/>
+                      <a:endParaRPr lang="fr-FR" sz="1000" dirty="0"/>
+                    </a:p>
+                  </a:txBody>
+                  <a:tcPr/>
+                </a:tc>
+                <a:extLst>
+                  <a:ext uri="{0D108BD9-81ED-4DB2-BD59-A6C34878D82A}">
+                    <a16:rowId xmlns:a16="http://schemas.microsoft.com/office/drawing/2014/main" val="1474716101"/>
+                  </a:ext>
+                </a:extLst>
+              </a:tr>
+            </a:tbl>
+          </a:graphicData>
+        </a:graphic>
+      </p:graphicFrame>
+    </p:spTree>
+    <p:extLst>
+      <p:ext uri="{BB962C8B-B14F-4D97-AF65-F5344CB8AC3E}">
+        <p14:creationId xmlns:p14="http://schemas.microsoft.com/office/powerpoint/2010/main" val="2579590077"/>
+      </p:ext>
+    </p:extLst>
+  </p:cSld>
+  <p:clrMapOvr>
+    <a:masterClrMapping/>
+  </p:clrMapOvr>
+</p:sld>
+</file>
+
+<file path=ppt/slides/slide3.xml><?xml version="1.0" encoding="utf-8"?>
+<p:sld xmlns:a="http://schemas.openxmlformats.org/drawingml/2006/main" xmlns:r="http://schemas.openxmlformats.org/officeDocument/2006/relationships" xmlns:p="http://schemas.openxmlformats.org/presentationml/2006/main">
+  <p:cSld>
+    <p:spTree>
+      <p:nvGrpSpPr>
+        <p:cNvPr id="1" name=""/>
+        <p:cNvGrpSpPr/>
+        <p:nvPr/>
+      </p:nvGrpSpPr>
+      <p:grpSpPr>
+        <a:xfrm>
+          <a:off x="0" y="0"/>
+          <a:ext cx="0" cy="0"/>
+          <a:chOff x="0" y="0"/>
+          <a:chExt cx="0" cy="0"/>
+        </a:xfrm>
+      </p:grpSpPr>
+      <p:graphicFrame>
+        <p:nvGraphicFramePr>
+          <p:cNvPr id="4" name="Tableau 3">
+            <a:extLst>
+              <a:ext uri="{FF2B5EF4-FFF2-40B4-BE49-F238E27FC236}">
+                <a16:creationId xmlns:a16="http://schemas.microsoft.com/office/drawing/2014/main" id="{92107B6C-A9A1-4291-9AF3-4E2986955AD8}"/>
+              </a:ext>
+            </a:extLst>
+          </p:cNvPr>
+          <p:cNvGraphicFramePr>
+            <a:graphicFrameLocks noGrp="1"/>
+          </p:cNvGraphicFramePr>
+          <p:nvPr>
+            <p:extLst>
+              <p:ext uri="{D42A27DB-BD31-4B8C-83A1-F6EECF244321}">
+                <p14:modId xmlns:p14="http://schemas.microsoft.com/office/powerpoint/2010/main" val="1243834478"/>
+              </p:ext>
+            </p:extLst>
+          </p:nvPr>
+        </p:nvGraphicFramePr>
+        <p:xfrm>
+          <a:off x="374700" y="1097280"/>
+          <a:ext cx="11442600" cy="4146170"/>
+        </p:xfrm>
+        <a:graphic>
+          <a:graphicData uri="http://schemas.openxmlformats.org/drawingml/2006/table">
+            <a:tbl>
+              <a:tblPr firstRow="1" bandRow="1">
+                <a:tableStyleId>{073A0DAA-6AF3-43AB-8588-CEC1D06C72B9}</a:tableStyleId>
+              </a:tblPr>
+              <a:tblGrid>
+                <a:gridCol w="953550">
+                  <a:extLst>
+                    <a:ext uri="{9D8B030D-6E8A-4147-A177-3AD203B41FA5}">
+                      <a16:colId xmlns:a16="http://schemas.microsoft.com/office/drawing/2014/main" val="3204059839"/>
+                    </a:ext>
+                  </a:extLst>
+                </a:gridCol>
+                <a:gridCol w="953550">
+                  <a:extLst>
+                    <a:ext uri="{9D8B030D-6E8A-4147-A177-3AD203B41FA5}">
+                      <a16:colId xmlns:a16="http://schemas.microsoft.com/office/drawing/2014/main" val="1638696339"/>
+                    </a:ext>
+                  </a:extLst>
+                </a:gridCol>
+                <a:gridCol w="953550">
+                  <a:extLst>
+                    <a:ext uri="{9D8B030D-6E8A-4147-A177-3AD203B41FA5}">
+                      <a16:colId xmlns:a16="http://schemas.microsoft.com/office/drawing/2014/main" val="1694572338"/>
+                    </a:ext>
+                  </a:extLst>
+                </a:gridCol>
+                <a:gridCol w="953550">
+                  <a:extLst>
+                    <a:ext uri="{9D8B030D-6E8A-4147-A177-3AD203B41FA5}">
+                      <a16:colId xmlns:a16="http://schemas.microsoft.com/office/drawing/2014/main" val="1817226097"/>
+                    </a:ext>
+                  </a:extLst>
+                </a:gridCol>
+                <a:gridCol w="953550">
+                  <a:extLst>
+                    <a:ext uri="{9D8B030D-6E8A-4147-A177-3AD203B41FA5}">
+                      <a16:colId xmlns:a16="http://schemas.microsoft.com/office/drawing/2014/main" val="1032482738"/>
+                    </a:ext>
+                  </a:extLst>
+                </a:gridCol>
+                <a:gridCol w="953550">
+                  <a:extLst>
+                    <a:ext uri="{9D8B030D-6E8A-4147-A177-3AD203B41FA5}">
+                      <a16:colId xmlns:a16="http://schemas.microsoft.com/office/drawing/2014/main" val="2243804602"/>
+                    </a:ext>
+                  </a:extLst>
+                </a:gridCol>
+                <a:gridCol w="953550">
+                  <a:extLst>
+                    <a:ext uri="{9D8B030D-6E8A-4147-A177-3AD203B41FA5}">
+                      <a16:colId xmlns:a16="http://schemas.microsoft.com/office/drawing/2014/main" val="2363909587"/>
+                    </a:ext>
+                  </a:extLst>
+                </a:gridCol>
+                <a:gridCol w="953550">
+                  <a:extLst>
+                    <a:ext uri="{9D8B030D-6E8A-4147-A177-3AD203B41FA5}">
+                      <a16:colId xmlns:a16="http://schemas.microsoft.com/office/drawing/2014/main" val="2050495864"/>
+                    </a:ext>
+                  </a:extLst>
+                </a:gridCol>
+                <a:gridCol w="953550">
+                  <a:extLst>
+                    <a:ext uri="{9D8B030D-6E8A-4147-A177-3AD203B41FA5}">
+                      <a16:colId xmlns:a16="http://schemas.microsoft.com/office/drawing/2014/main" val="3290253998"/>
+                    </a:ext>
+                  </a:extLst>
+                </a:gridCol>
+                <a:gridCol w="953550">
+                  <a:extLst>
+                    <a:ext uri="{9D8B030D-6E8A-4147-A177-3AD203B41FA5}">
+                      <a16:colId xmlns:a16="http://schemas.microsoft.com/office/drawing/2014/main" val="696849395"/>
+                    </a:ext>
+                  </a:extLst>
+                </a:gridCol>
+                <a:gridCol w="953550">
+                  <a:extLst>
+                    <a:ext uri="{9D8B030D-6E8A-4147-A177-3AD203B41FA5}">
+                      <a16:colId xmlns:a16="http://schemas.microsoft.com/office/drawing/2014/main" val="4008523773"/>
+                    </a:ext>
+                  </a:extLst>
+                </a:gridCol>
+                <a:gridCol w="953550">
+                  <a:extLst>
+                    <a:ext uri="{9D8B030D-6E8A-4147-A177-3AD203B41FA5}">
+                      <a16:colId xmlns:a16="http://schemas.microsoft.com/office/drawing/2014/main" val="2628736819"/>
+                    </a:ext>
+                  </a:extLst>
+                </a:gridCol>
+              </a:tblGrid>
+              <a:tr h="359288">
+                <a:tc>
+                  <a:txBody>
+                    <a:bodyPr/>
+                    <a:lstStyle/>
+                    <a:p>
+                      <a:pPr algn="ctr"/>
+                      <a:r>
+                        <a:rPr lang="fr-FR" sz="1000" dirty="0"/>
+                        <a:t>Nom</a:t>
+                      </a:r>
+                    </a:p>
+                  </a:txBody>
+                  <a:tcPr/>
+                </a:tc>
+                <a:tc>
+                  <a:txBody>
+                    <a:bodyPr/>
+                    <a:lstStyle/>
+                    <a:p>
+                      <a:pPr algn="ctr"/>
+                      <a:r>
+                        <a:rPr lang="fr-FR" sz="1000" dirty="0"/>
+                        <a:t>Type</a:t>
+                      </a:r>
+                    </a:p>
+                  </a:txBody>
+                  <a:tcPr/>
+                </a:tc>
+                <a:tc>
+                  <a:txBody>
+                    <a:bodyPr/>
+                    <a:lstStyle/>
+                    <a:p>
+                      <a:pPr algn="ctr"/>
+                      <a:r>
+                        <a:rPr lang="fr-FR" sz="1000" dirty="0"/>
+                        <a:t>PP</a:t>
+                      </a:r>
+                    </a:p>
+                  </a:txBody>
+                  <a:tcPr/>
+                </a:tc>
+                <a:tc>
+                  <a:txBody>
+                    <a:bodyPr/>
+                    <a:lstStyle/>
+                    <a:p>
+                      <a:pPr algn="ctr"/>
+                      <a:r>
+                        <a:rPr lang="fr-FR" sz="1000" dirty="0"/>
+                        <a:t>PUISSANCE</a:t>
+                      </a:r>
+                    </a:p>
+                  </a:txBody>
+                  <a:tcPr/>
+                </a:tc>
+                <a:tc>
+                  <a:txBody>
+                    <a:bodyPr/>
+                    <a:lstStyle/>
+                    <a:p>
+                      <a:pPr algn="ctr"/>
+                      <a:r>
+                        <a:rPr lang="fr-FR" sz="1000" dirty="0"/>
+                        <a:t>PRECISION</a:t>
+                      </a:r>
+                    </a:p>
+                  </a:txBody>
+                  <a:tcPr/>
+                </a:tc>
+                <a:tc>
+                  <a:txBody>
+                    <a:bodyPr/>
+                    <a:lstStyle/>
+                    <a:p>
+                      <a:pPr algn="ctr"/>
+                      <a:r>
+                        <a:rPr lang="fr-FR" sz="1000" dirty="0">
+                          <a:solidFill>
+                            <a:srgbClr val="C00000"/>
+                          </a:solidFill>
+                        </a:rPr>
+                        <a:t>Catégorie</a:t>
+                      </a:r>
+                      <a:endParaRPr lang="fr-FR" sz="1000" dirty="0"/>
+                    </a:p>
+                  </a:txBody>
+                  <a:tcPr/>
+                </a:tc>
+                <a:tc>
+                  <a:txBody>
+                    <a:bodyPr/>
+                    <a:lstStyle/>
+                    <a:p>
+                      <a:pPr algn="ctr"/>
+                      <a:endParaRPr lang="fr-FR" sz="1000" dirty="0"/>
+                    </a:p>
+                  </a:txBody>
+                  <a:tcPr/>
+                </a:tc>
+                <a:tc>
+                  <a:txBody>
+                    <a:bodyPr/>
+                    <a:lstStyle/>
+                    <a:p>
+                      <a:pPr algn="ctr"/>
+                      <a:endParaRPr lang="fr-FR" sz="1000" dirty="0"/>
+                    </a:p>
+                  </a:txBody>
+                  <a:tcPr/>
+                </a:tc>
+                <a:tc>
+                  <a:txBody>
+                    <a:bodyPr/>
+                    <a:lstStyle/>
+                    <a:p>
+                      <a:pPr algn="ctr"/>
+                      <a:endParaRPr lang="fr-FR" sz="1000" dirty="0"/>
+                    </a:p>
+                  </a:txBody>
+                  <a:tcPr/>
+                </a:tc>
+                <a:tc>
+                  <a:txBody>
+                    <a:bodyPr/>
+                    <a:lstStyle/>
+                    <a:p>
+                      <a:pPr algn="ctr"/>
+                      <a:endParaRPr lang="fr-FR" sz="1000" dirty="0"/>
+                    </a:p>
+                  </a:txBody>
+                  <a:tcPr/>
+                </a:tc>
+                <a:tc>
+                  <a:txBody>
+                    <a:bodyPr/>
+                    <a:lstStyle/>
+                    <a:p>
+                      <a:pPr algn="ctr"/>
+                      <a:endParaRPr lang="fr-FR" sz="1000" dirty="0"/>
+                    </a:p>
+                  </a:txBody>
+                  <a:tcPr/>
+                </a:tc>
+                <a:tc>
+                  <a:txBody>
+                    <a:bodyPr/>
+                    <a:lstStyle/>
+                    <a:p>
+                      <a:pPr algn="ctr"/>
+                      <a:endParaRPr lang="fr-FR" sz="1000" dirty="0"/>
+                    </a:p>
+                  </a:txBody>
+                  <a:tcPr/>
+                </a:tc>
+                <a:extLst>
+                  <a:ext uri="{0D108BD9-81ED-4DB2-BD59-A6C34878D82A}">
+                    <a16:rowId xmlns:a16="http://schemas.microsoft.com/office/drawing/2014/main" val="1439004379"/>
+                  </a:ext>
+                </a:extLst>
+              </a:tr>
+              <a:tr h="330029">
+                <a:tc>
+                  <a:txBody>
+                    <a:bodyPr/>
+                    <a:lstStyle/>
+                    <a:p>
+                      <a:pPr algn="ctr"/>
+                      <a:r>
+                        <a:rPr lang="fr-FR" sz="1000" dirty="0"/>
+                        <a:t>Aire d'eau</a:t>
+                      </a:r>
+                    </a:p>
+                  </a:txBody>
+                  <a:tcPr/>
+                </a:tc>
+                <a:tc>
+                  <a:txBody>
+                    <a:bodyPr/>
+                    <a:lstStyle/>
+                    <a:p>
+                      <a:pPr algn="ctr"/>
+                      <a:r>
+                        <a:rPr lang="fr-FR" sz="1000" dirty="0"/>
+                        <a:t>Eau</a:t>
+                      </a:r>
+                    </a:p>
+                  </a:txBody>
+                  <a:tcPr/>
+                </a:tc>
+                <a:tc>
+                  <a:txBody>
+                    <a:bodyPr/>
+                    <a:lstStyle/>
+                    <a:p>
+                      <a:pPr algn="ctr"/>
+                      <a:r>
+                        <a:rPr lang="fr-FR" sz="1000" dirty="0"/>
+                        <a:t>10</a:t>
+                      </a:r>
+                    </a:p>
+                  </a:txBody>
+                  <a:tcPr/>
+                </a:tc>
+                <a:tc>
+                  <a:txBody>
+                    <a:bodyPr/>
+                    <a:lstStyle/>
+                    <a:p>
+                      <a:pPr algn="ctr"/>
+                      <a:r>
+                        <a:rPr lang="fr-FR" sz="1000" dirty="0"/>
+                        <a:t>50</a:t>
+                      </a:r>
+                    </a:p>
+                  </a:txBody>
+                  <a:tcPr/>
+                </a:tc>
+                <a:tc>
+                  <a:txBody>
+                    <a:bodyPr/>
+                    <a:lstStyle/>
+                    <a:p>
+                      <a:pPr algn="ctr"/>
+                      <a:r>
+                        <a:rPr lang="fr-FR" sz="1000" dirty="0"/>
+                        <a:t>100</a:t>
+                      </a:r>
+                    </a:p>
+                  </a:txBody>
+                  <a:tcPr/>
+                </a:tc>
+                <a:tc>
+                  <a:txBody>
+                    <a:bodyPr/>
+                    <a:lstStyle/>
+                    <a:p>
+                      <a:pPr algn="ctr"/>
+                      <a:r>
+                        <a:rPr lang="fr-FR" sz="1000" dirty="0" err="1"/>
+                        <a:t>Spe</a:t>
+                      </a:r>
+                      <a:endParaRPr lang="fr-FR" sz="1000" dirty="0"/>
+                    </a:p>
+                  </a:txBody>
+                  <a:tcPr/>
+                </a:tc>
+                <a:tc>
+                  <a:txBody>
+                    <a:bodyPr/>
+                    <a:lstStyle/>
+                    <a:p>
+                      <a:pPr algn="ctr"/>
+                      <a:endParaRPr lang="fr-FR" sz="1000" dirty="0"/>
+                    </a:p>
+                  </a:txBody>
+                  <a:tcPr/>
+                </a:tc>
+                <a:tc>
+                  <a:txBody>
+                    <a:bodyPr/>
+                    <a:lstStyle/>
+                    <a:p>
+                      <a:pPr algn="ctr"/>
+                      <a:endParaRPr lang="fr-FR" sz="1000" dirty="0"/>
+                    </a:p>
+                  </a:txBody>
+                  <a:tcPr/>
+                </a:tc>
+                <a:tc>
+                  <a:txBody>
+                    <a:bodyPr/>
+                    <a:lstStyle/>
+                    <a:p>
+                      <a:pPr algn="ctr"/>
+                      <a:endParaRPr lang="fr-FR" sz="1000" dirty="0"/>
+                    </a:p>
+                  </a:txBody>
+                  <a:tcPr/>
+                </a:tc>
+                <a:tc>
+                  <a:txBody>
+                    <a:bodyPr/>
+                    <a:lstStyle/>
+                    <a:p>
+                      <a:pPr algn="ctr"/>
+                      <a:endParaRPr lang="fr-FR" sz="1000" dirty="0"/>
+                    </a:p>
+                  </a:txBody>
+                  <a:tcPr/>
+                </a:tc>
+                <a:tc>
+                  <a:txBody>
+                    <a:bodyPr/>
+                    <a:lstStyle/>
+                    <a:p>
+                      <a:pPr algn="ctr"/>
+                      <a:endParaRPr lang="fr-FR" sz="1000" dirty="0"/>
+                    </a:p>
+                  </a:txBody>
+                  <a:tcPr/>
+                </a:tc>
+                <a:tc>
+                  <a:txBody>
+                    <a:bodyPr/>
+                    <a:lstStyle/>
+                    <a:p>
+                      <a:pPr algn="ctr"/>
+                      <a:endParaRPr lang="fr-FR" sz="1000" dirty="0"/>
+                    </a:p>
+                  </a:txBody>
+                  <a:tcPr/>
+                </a:tc>
+                <a:extLst>
+                  <a:ext uri="{0D108BD9-81ED-4DB2-BD59-A6C34878D82A}">
+                    <a16:rowId xmlns:a16="http://schemas.microsoft.com/office/drawing/2014/main" val="3097686795"/>
+                  </a:ext>
+                </a:extLst>
+              </a:tr>
+              <a:tr h="309489">
+                <a:tc>
+                  <a:txBody>
+                    <a:bodyPr/>
+                    <a:lstStyle/>
+                    <a:p>
+                      <a:pPr algn="ctr"/>
+                      <a:r>
+                        <a:rPr lang="fr-FR" sz="1000" dirty="0" err="1"/>
+                        <a:t>Hydroqueue</a:t>
+                      </a:r>
+                      <a:endParaRPr lang="fr-FR" sz="1000" dirty="0"/>
+                    </a:p>
+                  </a:txBody>
+                  <a:tcPr/>
+                </a:tc>
+                <a:tc>
+                  <a:txBody>
+                    <a:bodyPr/>
+                    <a:lstStyle/>
+                    <a:p>
+                      <a:pPr algn="ctr"/>
+                      <a:r>
+                        <a:rPr lang="fr-FR" sz="1000" dirty="0"/>
+                        <a:t>Eau</a:t>
+                      </a:r>
+                    </a:p>
+                  </a:txBody>
+                  <a:tcPr/>
+                </a:tc>
+                <a:tc>
+                  <a:txBody>
+                    <a:bodyPr/>
+                    <a:lstStyle/>
+                    <a:p>
+                      <a:pPr algn="ctr"/>
+                      <a:r>
+                        <a:rPr lang="fr-FR" sz="1000" dirty="0"/>
+                        <a:t>10</a:t>
+                      </a:r>
+                    </a:p>
+                  </a:txBody>
+                  <a:tcPr/>
+                </a:tc>
+                <a:tc>
+                  <a:txBody>
+                    <a:bodyPr/>
+                    <a:lstStyle/>
+                    <a:p>
+                      <a:pPr algn="ctr"/>
+                      <a:r>
+                        <a:rPr lang="fr-FR" sz="1000" dirty="0"/>
+                        <a:t>190</a:t>
+                      </a:r>
+                    </a:p>
+                  </a:txBody>
+                  <a:tcPr/>
+                </a:tc>
+                <a:tc>
+                  <a:txBody>
+                    <a:bodyPr/>
+                    <a:lstStyle/>
+                    <a:p>
+                      <a:pPr algn="ctr"/>
+                      <a:r>
+                        <a:rPr lang="fr-FR" sz="1000" dirty="0"/>
+                        <a:t>90</a:t>
+                      </a:r>
+                    </a:p>
+                  </a:txBody>
+                  <a:tcPr/>
+                </a:tc>
+                <a:tc>
+                  <a:txBody>
+                    <a:bodyPr/>
+                    <a:lstStyle/>
+                    <a:p>
+                      <a:pPr algn="ctr"/>
+                      <a:endParaRPr lang="fr-FR" sz="1000" dirty="0"/>
+                    </a:p>
+                  </a:txBody>
+                  <a:tcPr/>
+                </a:tc>
+                <a:tc>
+                  <a:txBody>
+                    <a:bodyPr/>
+                    <a:lstStyle/>
+                    <a:p>
+                      <a:pPr algn="ctr"/>
+                      <a:endParaRPr lang="fr-FR" sz="1000" dirty="0"/>
+                    </a:p>
+                  </a:txBody>
+                  <a:tcPr/>
+                </a:tc>
+                <a:tc>
+                  <a:txBody>
+                    <a:bodyPr/>
+                    <a:lstStyle/>
+                    <a:p>
+                      <a:pPr algn="ctr"/>
+                      <a:endParaRPr lang="fr-FR" sz="1000" dirty="0"/>
+                    </a:p>
+                  </a:txBody>
+                  <a:tcPr/>
+                </a:tc>
+                <a:tc>
+                  <a:txBody>
+                    <a:bodyPr/>
+                    <a:lstStyle/>
+                    <a:p>
+                      <a:pPr algn="ctr"/>
+                      <a:endParaRPr lang="fr-FR" sz="1000" dirty="0"/>
+                    </a:p>
+                  </a:txBody>
+                  <a:tcPr/>
+                </a:tc>
+                <a:tc>
+                  <a:txBody>
+                    <a:bodyPr/>
+                    <a:lstStyle/>
+                    <a:p>
+                      <a:pPr algn="ctr"/>
+                      <a:endParaRPr lang="fr-FR" sz="1000" dirty="0"/>
+                    </a:p>
+                  </a:txBody>
+                  <a:tcPr/>
+                </a:tc>
+                <a:tc>
+                  <a:txBody>
+                    <a:bodyPr/>
+                    <a:lstStyle/>
+                    <a:p>
+                      <a:pPr algn="ctr"/>
+                      <a:endParaRPr lang="fr-FR" sz="1000" dirty="0"/>
+                    </a:p>
+                  </a:txBody>
+                  <a:tcPr/>
+                </a:tc>
+                <a:tc>
+                  <a:txBody>
+                    <a:bodyPr/>
+                    <a:lstStyle/>
+                    <a:p>
+                      <a:pPr algn="ctr"/>
+                      <a:endParaRPr lang="fr-FR" sz="1000" dirty="0"/>
+                    </a:p>
+                  </a:txBody>
+                  <a:tcPr/>
+                </a:tc>
+                <a:extLst>
+                  <a:ext uri="{0D108BD9-81ED-4DB2-BD59-A6C34878D82A}">
+                    <a16:rowId xmlns:a16="http://schemas.microsoft.com/office/drawing/2014/main" val="402988641"/>
+                  </a:ext>
+                </a:extLst>
+              </a:tr>
+              <a:tr h="407963">
+                <a:tc>
+                  <a:txBody>
+                    <a:bodyPr/>
+                    <a:lstStyle/>
+                    <a:p>
+                      <a:pPr algn="ctr"/>
+                      <a:r>
+                        <a:rPr lang="fr-FR" sz="1000" dirty="0" err="1"/>
+                        <a:t>CoupVictoire</a:t>
+                      </a:r>
+                      <a:endParaRPr lang="fr-FR" sz="1000" dirty="0"/>
+                    </a:p>
+                  </a:txBody>
+                  <a:tcPr/>
+                </a:tc>
+                <a:tc>
+                  <a:txBody>
+                    <a:bodyPr/>
+                    <a:lstStyle/>
+                    <a:p>
+                      <a:pPr algn="ctr"/>
+                      <a:r>
+                        <a:rPr lang="fr-FR" sz="1000" dirty="0"/>
+                        <a:t>Feu</a:t>
+                      </a:r>
+                    </a:p>
+                  </a:txBody>
+                  <a:tcPr/>
+                </a:tc>
+                <a:tc>
+                  <a:txBody>
+                    <a:bodyPr/>
+                    <a:lstStyle/>
+                    <a:p>
+                      <a:pPr algn="ctr"/>
+                      <a:r>
+                        <a:rPr lang="fr-FR" sz="1000" dirty="0"/>
+                        <a:t>5</a:t>
+                      </a:r>
+                    </a:p>
+                  </a:txBody>
+                  <a:tcPr/>
+                </a:tc>
+                <a:tc>
+                  <a:txBody>
+                    <a:bodyPr/>
+                    <a:lstStyle/>
+                    <a:p>
+                      <a:pPr algn="ctr"/>
+                      <a:r>
+                        <a:rPr lang="fr-FR" sz="1000" dirty="0"/>
+                        <a:t>180</a:t>
+                      </a:r>
+                    </a:p>
+                  </a:txBody>
+                  <a:tcPr/>
+                </a:tc>
+                <a:tc>
+                  <a:txBody>
+                    <a:bodyPr/>
+                    <a:lstStyle/>
+                    <a:p>
+                      <a:pPr algn="ctr"/>
+                      <a:r>
+                        <a:rPr lang="fr-FR" sz="1000" dirty="0"/>
+                        <a:t>95</a:t>
+                      </a:r>
+                    </a:p>
+                  </a:txBody>
+                  <a:tcPr/>
+                </a:tc>
+                <a:tc>
+                  <a:txBody>
+                    <a:bodyPr/>
+                    <a:lstStyle/>
+                    <a:p>
+                      <a:pPr algn="ctr"/>
+                      <a:endParaRPr lang="fr-FR" sz="1000" dirty="0"/>
+                    </a:p>
+                  </a:txBody>
+                  <a:tcPr/>
+                </a:tc>
+                <a:tc>
+                  <a:txBody>
+                    <a:bodyPr/>
+                    <a:lstStyle/>
+                    <a:p>
+                      <a:pPr algn="ctr"/>
+                      <a:endParaRPr lang="fr-FR" sz="1000" dirty="0"/>
+                    </a:p>
+                  </a:txBody>
+                  <a:tcPr/>
+                </a:tc>
+                <a:tc>
+                  <a:txBody>
+                    <a:bodyPr/>
+                    <a:lstStyle/>
+                    <a:p>
+                      <a:pPr algn="ctr"/>
+                      <a:endParaRPr lang="fr-FR" sz="1000" dirty="0"/>
+                    </a:p>
+                  </a:txBody>
+                  <a:tcPr/>
+                </a:tc>
+                <a:tc>
+                  <a:txBody>
+                    <a:bodyPr/>
+                    <a:lstStyle/>
+                    <a:p>
+                      <a:pPr algn="ctr"/>
+                      <a:endParaRPr lang="fr-FR" sz="1000" dirty="0"/>
+                    </a:p>
+                  </a:txBody>
+                  <a:tcPr/>
+                </a:tc>
+                <a:tc>
+                  <a:txBody>
+                    <a:bodyPr/>
+                    <a:lstStyle/>
+                    <a:p>
+                      <a:pPr algn="ctr"/>
+                      <a:endParaRPr lang="fr-FR" sz="1000" dirty="0"/>
+                    </a:p>
+                  </a:txBody>
+                  <a:tcPr/>
+                </a:tc>
+                <a:tc>
+                  <a:txBody>
+                    <a:bodyPr/>
+                    <a:lstStyle/>
+                    <a:p>
+                      <a:pPr algn="ctr"/>
+                      <a:endParaRPr lang="fr-FR" sz="1000" dirty="0"/>
+                    </a:p>
+                  </a:txBody>
+                  <a:tcPr/>
+                </a:tc>
+                <a:tc>
+                  <a:txBody>
+                    <a:bodyPr/>
+                    <a:lstStyle/>
+                    <a:p>
+                      <a:pPr algn="ctr"/>
+                      <a:endParaRPr lang="fr-FR" sz="1000" dirty="0"/>
+                    </a:p>
+                  </a:txBody>
+                  <a:tcPr/>
+                </a:tc>
+                <a:extLst>
+                  <a:ext uri="{0D108BD9-81ED-4DB2-BD59-A6C34878D82A}">
+                    <a16:rowId xmlns:a16="http://schemas.microsoft.com/office/drawing/2014/main" val="2790993927"/>
+                  </a:ext>
+                </a:extLst>
+              </a:tr>
+              <a:tr h="393896">
+                <a:tc>
+                  <a:txBody>
+                    <a:bodyPr/>
+                    <a:lstStyle/>
+                    <a:p>
+                      <a:pPr algn="ctr"/>
+                      <a:r>
+                        <a:rPr lang="fr-FR" sz="1000" dirty="0" err="1"/>
+                        <a:t>RafaleFeu</a:t>
+                      </a:r>
+                      <a:endParaRPr lang="fr-FR" sz="1000" dirty="0"/>
+                    </a:p>
+                  </a:txBody>
+                  <a:tcPr/>
+                </a:tc>
+                <a:tc>
+                  <a:txBody>
+                    <a:bodyPr/>
+                    <a:lstStyle/>
+                    <a:p>
+                      <a:pPr algn="ctr"/>
+                      <a:r>
+                        <a:rPr lang="fr-FR" sz="1000" dirty="0"/>
+                        <a:t>Feu</a:t>
+                      </a:r>
+                    </a:p>
+                  </a:txBody>
+                  <a:tcPr/>
+                </a:tc>
+                <a:tc>
+                  <a:txBody>
+                    <a:bodyPr/>
+                    <a:lstStyle/>
+                    <a:p>
+                      <a:pPr algn="ctr"/>
+                      <a:r>
+                        <a:rPr lang="fr-FR" sz="1000" dirty="0"/>
+                        <a:t>5</a:t>
+                      </a:r>
+                    </a:p>
+                  </a:txBody>
+                  <a:tcPr/>
+                </a:tc>
+                <a:tc>
+                  <a:txBody>
+                    <a:bodyPr/>
+                    <a:lstStyle/>
+                    <a:p>
+                      <a:pPr algn="ctr"/>
+                      <a:r>
+                        <a:rPr lang="fr-FR" sz="1000" dirty="0"/>
+                        <a:t>150</a:t>
+                      </a:r>
+                    </a:p>
+                  </a:txBody>
+                  <a:tcPr/>
+                </a:tc>
+                <a:tc>
+                  <a:txBody>
+                    <a:bodyPr/>
+                    <a:lstStyle/>
+                    <a:p>
+                      <a:pPr algn="ctr"/>
+                      <a:r>
+                        <a:rPr lang="fr-FR" sz="1000" dirty="0"/>
+                        <a:t>90</a:t>
+                      </a:r>
+                    </a:p>
+                  </a:txBody>
+                  <a:tcPr/>
+                </a:tc>
+                <a:tc>
+                  <a:txBody>
+                    <a:bodyPr/>
+                    <a:lstStyle/>
+                    <a:p>
+                      <a:pPr algn="ctr"/>
+                      <a:r>
+                        <a:rPr lang="fr-FR" sz="1000" dirty="0"/>
+                        <a:t>spé</a:t>
+                      </a:r>
+                    </a:p>
+                  </a:txBody>
+                  <a:tcPr/>
+                </a:tc>
+                <a:tc>
+                  <a:txBody>
+                    <a:bodyPr/>
+                    <a:lstStyle/>
+                    <a:p>
+                      <a:pPr algn="ctr"/>
+                      <a:endParaRPr lang="fr-FR" sz="1000" dirty="0"/>
+                    </a:p>
+                  </a:txBody>
+                  <a:tcPr/>
+                </a:tc>
+                <a:tc>
+                  <a:txBody>
+                    <a:bodyPr/>
+                    <a:lstStyle/>
+                    <a:p>
+                      <a:pPr algn="ctr"/>
+                      <a:endParaRPr lang="fr-FR" sz="1000" dirty="0"/>
+                    </a:p>
+                  </a:txBody>
+                  <a:tcPr/>
+                </a:tc>
+                <a:tc>
+                  <a:txBody>
+                    <a:bodyPr/>
+                    <a:lstStyle/>
+                    <a:p>
+                      <a:pPr algn="ctr"/>
+                      <a:endParaRPr lang="fr-FR" sz="1000" dirty="0"/>
+                    </a:p>
+                  </a:txBody>
+                  <a:tcPr/>
+                </a:tc>
+                <a:tc>
+                  <a:txBody>
+                    <a:bodyPr/>
+                    <a:lstStyle/>
+                    <a:p>
+                      <a:pPr algn="ctr"/>
+                      <a:endParaRPr lang="fr-FR" sz="1000" dirty="0"/>
+                    </a:p>
+                  </a:txBody>
+                  <a:tcPr/>
+                </a:tc>
+                <a:tc>
+                  <a:txBody>
+                    <a:bodyPr/>
+                    <a:lstStyle/>
+                    <a:p>
+                      <a:pPr algn="ctr"/>
+                      <a:endParaRPr lang="fr-FR" sz="1000" dirty="0"/>
+                    </a:p>
+                  </a:txBody>
+                  <a:tcPr/>
+                </a:tc>
+                <a:tc>
+                  <a:txBody>
+                    <a:bodyPr/>
+                    <a:lstStyle/>
+                    <a:p>
+                      <a:pPr algn="ctr"/>
+                      <a:endParaRPr lang="fr-FR" sz="1000" dirty="0"/>
+                    </a:p>
+                  </a:txBody>
+                  <a:tcPr/>
+                </a:tc>
+                <a:extLst>
+                  <a:ext uri="{0D108BD9-81ED-4DB2-BD59-A6C34878D82A}">
+                    <a16:rowId xmlns:a16="http://schemas.microsoft.com/office/drawing/2014/main" val="1013587500"/>
+                  </a:ext>
+                </a:extLst>
+              </a:tr>
+              <a:tr h="379827">
+                <a:tc>
+                  <a:txBody>
+                    <a:bodyPr/>
+                    <a:lstStyle/>
+                    <a:p>
+                      <a:pPr algn="ctr"/>
+                      <a:r>
+                        <a:rPr lang="fr-FR" sz="1000" dirty="0" err="1"/>
+                        <a:t>RocBoulet</a:t>
+                      </a:r>
+                      <a:endParaRPr lang="fr-FR" sz="1000" dirty="0"/>
+                    </a:p>
+                  </a:txBody>
+                  <a:tcPr/>
+                </a:tc>
+                <a:tc>
+                  <a:txBody>
+                    <a:bodyPr/>
+                    <a:lstStyle/>
+                    <a:p>
+                      <a:pPr algn="ctr"/>
+                      <a:r>
+                        <a:rPr lang="fr-FR" sz="1000" dirty="0"/>
+                        <a:t>Roche</a:t>
+                      </a:r>
+                    </a:p>
+                  </a:txBody>
+                  <a:tcPr/>
+                </a:tc>
+                <a:tc>
+                  <a:txBody>
+                    <a:bodyPr/>
+                    <a:lstStyle/>
+                    <a:p>
+                      <a:pPr algn="ctr"/>
+                      <a:r>
+                        <a:rPr lang="fr-FR" sz="1000" dirty="0"/>
+                        <a:t>20</a:t>
+                      </a:r>
+                    </a:p>
+                  </a:txBody>
+                  <a:tcPr/>
+                </a:tc>
+                <a:tc>
+                  <a:txBody>
+                    <a:bodyPr/>
+                    <a:lstStyle/>
+                    <a:p>
+                      <a:pPr algn="ctr"/>
+                      <a:r>
+                        <a:rPr lang="fr-FR" sz="1000" dirty="0"/>
+                        <a:t>150</a:t>
+                      </a:r>
+                    </a:p>
+                  </a:txBody>
+                  <a:tcPr/>
+                </a:tc>
+                <a:tc>
+                  <a:txBody>
+                    <a:bodyPr/>
+                    <a:lstStyle/>
+                    <a:p>
+                      <a:pPr algn="ctr"/>
+                      <a:r>
+                        <a:rPr lang="fr-FR" sz="1000" dirty="0"/>
+                        <a:t>60</a:t>
+                      </a:r>
+                    </a:p>
+                  </a:txBody>
+                  <a:tcPr/>
+                </a:tc>
+                <a:tc>
+                  <a:txBody>
+                    <a:bodyPr/>
+                    <a:lstStyle/>
+                    <a:p>
+                      <a:pPr algn="ctr"/>
+                      <a:endParaRPr lang="fr-FR" sz="1000" dirty="0"/>
+                    </a:p>
+                  </a:txBody>
+                  <a:tcPr/>
+                </a:tc>
+                <a:tc>
+                  <a:txBody>
+                    <a:bodyPr/>
+                    <a:lstStyle/>
+                    <a:p>
+                      <a:pPr algn="ctr"/>
+                      <a:endParaRPr lang="fr-FR" sz="1000" dirty="0"/>
+                    </a:p>
+                  </a:txBody>
+                  <a:tcPr/>
+                </a:tc>
+                <a:tc>
+                  <a:txBody>
+                    <a:bodyPr/>
+                    <a:lstStyle/>
+                    <a:p>
+                      <a:pPr algn="ctr"/>
+                      <a:endParaRPr lang="fr-FR" sz="1000" dirty="0"/>
+                    </a:p>
+                  </a:txBody>
+                  <a:tcPr/>
+                </a:tc>
+                <a:tc>
+                  <a:txBody>
+                    <a:bodyPr/>
+                    <a:lstStyle/>
+                    <a:p>
+                      <a:pPr algn="ctr"/>
+                      <a:endParaRPr lang="fr-FR" sz="1000" dirty="0"/>
+                    </a:p>
+                  </a:txBody>
+                  <a:tcPr/>
+                </a:tc>
+                <a:tc>
+                  <a:txBody>
+                    <a:bodyPr/>
+                    <a:lstStyle/>
+                    <a:p>
+                      <a:pPr algn="ctr"/>
+                      <a:endParaRPr lang="fr-FR" sz="1000" dirty="0"/>
+                    </a:p>
+                  </a:txBody>
+                  <a:tcPr/>
+                </a:tc>
+                <a:tc>
+                  <a:txBody>
+                    <a:bodyPr/>
+                    <a:lstStyle/>
+                    <a:p>
+                      <a:pPr algn="ctr"/>
+                      <a:endParaRPr lang="fr-FR" sz="1000" dirty="0"/>
+                    </a:p>
+                  </a:txBody>
+                  <a:tcPr/>
+                </a:tc>
+                <a:tc>
+                  <a:txBody>
+                    <a:bodyPr/>
+                    <a:lstStyle/>
+                    <a:p>
+                      <a:pPr algn="ctr"/>
+                      <a:endParaRPr lang="fr-FR" sz="1000" dirty="0"/>
+                    </a:p>
+                  </a:txBody>
+                  <a:tcPr/>
+                </a:tc>
+                <a:extLst>
+                  <a:ext uri="{0D108BD9-81ED-4DB2-BD59-A6C34878D82A}">
+                    <a16:rowId xmlns:a16="http://schemas.microsoft.com/office/drawing/2014/main" val="1547638070"/>
+                  </a:ext>
+                </a:extLst>
+              </a:tr>
+              <a:tr h="422031">
+                <a:tc>
+                  <a:txBody>
+                    <a:bodyPr/>
+                    <a:lstStyle/>
+                    <a:p>
+                      <a:pPr algn="ctr"/>
+                      <a:r>
+                        <a:rPr lang="fr-FR" sz="1000" dirty="0" err="1"/>
+                        <a:t>BouleRoc</a:t>
+                      </a:r>
+                      <a:endParaRPr lang="fr-FR" sz="1000" dirty="0"/>
+                    </a:p>
+                  </a:txBody>
+                  <a:tcPr/>
+                </a:tc>
+                <a:tc>
+                  <a:txBody>
+                    <a:bodyPr/>
+                    <a:lstStyle/>
+                    <a:p>
+                      <a:pPr algn="ctr"/>
+                      <a:r>
+                        <a:rPr lang="fr-FR" sz="1000" dirty="0"/>
+                        <a:t>Roche</a:t>
+                      </a:r>
+                    </a:p>
+                  </a:txBody>
+                  <a:tcPr/>
+                </a:tc>
+                <a:tc>
+                  <a:txBody>
+                    <a:bodyPr/>
+                    <a:lstStyle/>
+                    <a:p>
+                      <a:pPr algn="ctr"/>
+                      <a:r>
+                        <a:rPr lang="fr-FR" sz="1000" dirty="0"/>
+                        <a:t>10</a:t>
+                      </a:r>
+                    </a:p>
+                  </a:txBody>
+                  <a:tcPr/>
+                </a:tc>
+                <a:tc>
+                  <a:txBody>
+                    <a:bodyPr/>
+                    <a:lstStyle/>
+                    <a:p>
+                      <a:pPr algn="ctr"/>
+                      <a:r>
+                        <a:rPr lang="fr-FR" sz="1000" dirty="0"/>
+                        <a:t>25</a:t>
+                      </a:r>
+                    </a:p>
+                  </a:txBody>
+                  <a:tcPr/>
+                </a:tc>
+                <a:tc>
+                  <a:txBody>
+                    <a:bodyPr/>
+                    <a:lstStyle/>
+                    <a:p>
+                      <a:pPr algn="ctr"/>
+                      <a:r>
+                        <a:rPr lang="fr-FR" sz="1000" dirty="0"/>
+                        <a:t>80</a:t>
+                      </a:r>
+                    </a:p>
+                  </a:txBody>
+                  <a:tcPr/>
+                </a:tc>
+                <a:tc>
+                  <a:txBody>
+                    <a:bodyPr/>
+                    <a:lstStyle/>
+                    <a:p>
+                      <a:pPr algn="ctr"/>
+                      <a:endParaRPr lang="fr-FR" sz="1000" dirty="0"/>
+                    </a:p>
+                  </a:txBody>
+                  <a:tcPr/>
+                </a:tc>
+                <a:tc>
+                  <a:txBody>
+                    <a:bodyPr/>
+                    <a:lstStyle/>
+                    <a:p>
+                      <a:pPr algn="ctr"/>
+                      <a:endParaRPr lang="fr-FR" sz="1000" dirty="0"/>
+                    </a:p>
+                  </a:txBody>
+                  <a:tcPr/>
+                </a:tc>
+                <a:tc>
+                  <a:txBody>
+                    <a:bodyPr/>
+                    <a:lstStyle/>
+                    <a:p>
+                      <a:pPr algn="ctr"/>
+                      <a:endParaRPr lang="fr-FR" sz="1000" dirty="0"/>
+                    </a:p>
+                  </a:txBody>
+                  <a:tcPr/>
+                </a:tc>
+                <a:tc>
+                  <a:txBody>
+                    <a:bodyPr/>
+                    <a:lstStyle/>
+                    <a:p>
+                      <a:pPr algn="ctr"/>
+                      <a:endParaRPr lang="fr-FR" sz="1000" dirty="0"/>
+                    </a:p>
+                  </a:txBody>
+                  <a:tcPr/>
+                </a:tc>
+                <a:tc>
+                  <a:txBody>
+                    <a:bodyPr/>
+                    <a:lstStyle/>
+                    <a:p>
+                      <a:pPr algn="ctr"/>
+                      <a:endParaRPr lang="fr-FR" sz="1000" dirty="0"/>
+                    </a:p>
+                  </a:txBody>
+                  <a:tcPr/>
+                </a:tc>
+                <a:tc>
+                  <a:txBody>
+                    <a:bodyPr/>
+                    <a:lstStyle/>
+                    <a:p>
+                      <a:pPr algn="ctr"/>
+                      <a:endParaRPr lang="fr-FR" sz="1000" dirty="0"/>
+                    </a:p>
+                  </a:txBody>
+                  <a:tcPr/>
+                </a:tc>
+                <a:tc>
+                  <a:txBody>
+                    <a:bodyPr/>
+                    <a:lstStyle/>
+                    <a:p>
+                      <a:pPr algn="ctr"/>
+                      <a:endParaRPr lang="fr-FR" sz="1000" dirty="0"/>
+                    </a:p>
+                  </a:txBody>
+                  <a:tcPr/>
+                </a:tc>
+                <a:extLst>
+                  <a:ext uri="{0D108BD9-81ED-4DB2-BD59-A6C34878D82A}">
+                    <a16:rowId xmlns:a16="http://schemas.microsoft.com/office/drawing/2014/main" val="4020024340"/>
+                  </a:ext>
+                </a:extLst>
+              </a:tr>
+              <a:tr h="422031">
+                <a:tc>
+                  <a:txBody>
+                    <a:bodyPr/>
+                    <a:lstStyle/>
+                    <a:p>
+                      <a:pPr algn="ctr"/>
+                      <a:r>
+                        <a:rPr lang="fr-FR" sz="1000" dirty="0" err="1"/>
+                        <a:t>Seisme</a:t>
+                      </a:r>
+                      <a:endParaRPr lang="fr-FR" sz="1000" dirty="0"/>
+                    </a:p>
+                  </a:txBody>
+                  <a:tcPr/>
+                </a:tc>
+                <a:tc>
+                  <a:txBody>
+                    <a:bodyPr/>
+                    <a:lstStyle/>
+                    <a:p>
+                      <a:pPr algn="ctr"/>
+                      <a:r>
+                        <a:rPr lang="fr-FR" sz="1000" dirty="0"/>
+                        <a:t>Sol</a:t>
+                      </a:r>
+                    </a:p>
+                  </a:txBody>
+                  <a:tcPr/>
+                </a:tc>
+                <a:tc>
+                  <a:txBody>
+                    <a:bodyPr/>
+                    <a:lstStyle/>
+                    <a:p>
+                      <a:pPr algn="ctr"/>
+                      <a:r>
+                        <a:rPr lang="fr-FR" sz="1000" dirty="0"/>
+                        <a:t>10</a:t>
+                      </a:r>
+                    </a:p>
+                  </a:txBody>
+                  <a:tcPr/>
+                </a:tc>
+                <a:tc>
+                  <a:txBody>
+                    <a:bodyPr/>
+                    <a:lstStyle/>
+                    <a:p>
+                      <a:pPr algn="ctr"/>
+                      <a:r>
+                        <a:rPr lang="fr-FR" sz="1000" dirty="0"/>
+                        <a:t>250</a:t>
+                      </a:r>
+                    </a:p>
+                  </a:txBody>
+                  <a:tcPr/>
+                </a:tc>
+                <a:tc>
+                  <a:txBody>
+                    <a:bodyPr/>
+                    <a:lstStyle/>
+                    <a:p>
+                      <a:pPr algn="ctr"/>
+                      <a:r>
+                        <a:rPr lang="fr-FR" sz="1000" dirty="0"/>
+                        <a:t>50</a:t>
+                      </a:r>
+                    </a:p>
+                  </a:txBody>
+                  <a:tcPr/>
+                </a:tc>
+                <a:tc>
+                  <a:txBody>
+                    <a:bodyPr/>
+                    <a:lstStyle/>
+                    <a:p>
+                      <a:pPr algn="ctr"/>
+                      <a:endParaRPr lang="fr-FR" sz="1000" dirty="0"/>
+                    </a:p>
+                  </a:txBody>
+                  <a:tcPr/>
+                </a:tc>
+                <a:tc>
+                  <a:txBody>
+                    <a:bodyPr/>
+                    <a:lstStyle/>
+                    <a:p>
+                      <a:pPr algn="ctr"/>
+                      <a:endParaRPr lang="fr-FR" sz="1000" dirty="0"/>
+                    </a:p>
+                  </a:txBody>
+                  <a:tcPr/>
+                </a:tc>
+                <a:tc>
+                  <a:txBody>
+                    <a:bodyPr/>
+                    <a:lstStyle/>
+                    <a:p>
+                      <a:pPr algn="ctr"/>
+                      <a:endParaRPr lang="fr-FR" sz="1000" dirty="0"/>
+                    </a:p>
+                  </a:txBody>
+                  <a:tcPr/>
+                </a:tc>
+                <a:tc>
+                  <a:txBody>
+                    <a:bodyPr/>
+                    <a:lstStyle/>
+                    <a:p>
+                      <a:pPr algn="ctr"/>
+                      <a:endParaRPr lang="fr-FR" sz="1000" dirty="0"/>
+                    </a:p>
+                  </a:txBody>
+                  <a:tcPr/>
+                </a:tc>
+                <a:tc>
+                  <a:txBody>
+                    <a:bodyPr/>
+                    <a:lstStyle/>
+                    <a:p>
+                      <a:pPr algn="ctr"/>
+                      <a:endParaRPr lang="fr-FR" sz="1000" dirty="0"/>
+                    </a:p>
+                  </a:txBody>
+                  <a:tcPr/>
+                </a:tc>
+                <a:tc>
+                  <a:txBody>
+                    <a:bodyPr/>
+                    <a:lstStyle/>
+                    <a:p>
+                      <a:pPr algn="ctr"/>
+                      <a:endParaRPr lang="fr-FR" sz="1000" dirty="0"/>
+                    </a:p>
+                  </a:txBody>
+                  <a:tcPr/>
+                </a:tc>
+                <a:tc>
+                  <a:txBody>
+                    <a:bodyPr/>
+                    <a:lstStyle/>
+                    <a:p>
+                      <a:pPr algn="ctr"/>
+                      <a:endParaRPr lang="fr-FR" sz="1000" dirty="0"/>
+                    </a:p>
+                  </a:txBody>
+                  <a:tcPr/>
+                </a:tc>
+                <a:extLst>
+                  <a:ext uri="{0D108BD9-81ED-4DB2-BD59-A6C34878D82A}">
+                    <a16:rowId xmlns:a16="http://schemas.microsoft.com/office/drawing/2014/main" val="2871009961"/>
+                  </a:ext>
+                </a:extLst>
+              </a:tr>
+              <a:tr h="1121616">
+                <a:tc>
+                  <a:txBody>
+                    <a:bodyPr/>
+                    <a:lstStyle/>
+                    <a:p>
+                      <a:pPr algn="ctr"/>
+                      <a:r>
+                        <a:rPr lang="fr-FR" sz="1000" dirty="0" err="1"/>
+                        <a:t>TourbiSable</a:t>
+                      </a:r>
+                      <a:endParaRPr lang="fr-FR" sz="1000" dirty="0"/>
+                    </a:p>
+                  </a:txBody>
+                  <a:tcPr/>
+                </a:tc>
+                <a:tc>
+                  <a:txBody>
+                    <a:bodyPr/>
+                    <a:lstStyle/>
+                    <a:p>
+                      <a:pPr algn="ctr"/>
+                      <a:r>
+                        <a:rPr lang="fr-FR" sz="1000" dirty="0"/>
+                        <a:t>Sol</a:t>
+                      </a:r>
+                    </a:p>
+                  </a:txBody>
+                  <a:tcPr/>
+                </a:tc>
+                <a:tc>
+                  <a:txBody>
+                    <a:bodyPr/>
+                    <a:lstStyle/>
+                    <a:p>
+                      <a:pPr algn="ctr"/>
+                      <a:r>
+                        <a:rPr lang="fr-FR" sz="1000" dirty="0"/>
+                        <a:t>15</a:t>
+                      </a:r>
+                    </a:p>
+                  </a:txBody>
+                  <a:tcPr/>
+                </a:tc>
+                <a:tc>
+                  <a:txBody>
+                    <a:bodyPr/>
+                    <a:lstStyle/>
+                    <a:p>
+                      <a:pPr algn="ctr"/>
+                      <a:r>
+                        <a:rPr lang="fr-FR" sz="1000" dirty="0"/>
+                        <a:t>75</a:t>
+                      </a:r>
+                    </a:p>
+                  </a:txBody>
+                  <a:tcPr/>
+                </a:tc>
+                <a:tc>
+                  <a:txBody>
+                    <a:bodyPr/>
+                    <a:lstStyle/>
+                    <a:p>
+                      <a:pPr algn="ctr"/>
+                      <a:r>
+                        <a:rPr lang="fr-FR" sz="1000" dirty="0"/>
+                        <a:t>70</a:t>
+                      </a:r>
+                    </a:p>
+                  </a:txBody>
+                  <a:tcPr/>
+                </a:tc>
+                <a:tc>
+                  <a:txBody>
+                    <a:bodyPr/>
+                    <a:lstStyle/>
+                    <a:p>
+                      <a:pPr algn="ctr"/>
+                      <a:r>
+                        <a:rPr lang="fr-FR" sz="1000"/>
+                        <a:t>spé</a:t>
+                      </a:r>
+                      <a:endParaRPr lang="fr-FR" sz="1000" dirty="0"/>
+                    </a:p>
+                  </a:txBody>
+                  <a:tcPr/>
+                </a:tc>
+                <a:tc>
+                  <a:txBody>
+                    <a:bodyPr/>
+                    <a:lstStyle/>
+                    <a:p>
+                      <a:pPr algn="ctr"/>
+                      <a:endParaRPr lang="fr-FR" sz="1000" dirty="0"/>
+                    </a:p>
+                  </a:txBody>
+                  <a:tcPr/>
+                </a:tc>
+                <a:tc>
+                  <a:txBody>
+                    <a:bodyPr/>
+                    <a:lstStyle/>
+                    <a:p>
+                      <a:pPr algn="ctr"/>
+                      <a:endParaRPr lang="fr-FR" sz="1000" dirty="0"/>
+                    </a:p>
+                  </a:txBody>
+                  <a:tcPr/>
+                </a:tc>
+                <a:tc>
+                  <a:txBody>
+                    <a:bodyPr/>
+                    <a:lstStyle/>
+                    <a:p>
+                      <a:pPr algn="ctr"/>
+                      <a:endParaRPr lang="fr-FR" sz="1000" dirty="0"/>
+                    </a:p>
+                  </a:txBody>
+                  <a:tcPr/>
+                </a:tc>
+                <a:tc>
+                  <a:txBody>
+                    <a:bodyPr/>
+                    <a:lstStyle/>
+                    <a:p>
+                      <a:pPr algn="ctr"/>
+                      <a:endParaRPr lang="fr-FR" sz="1000" dirty="0"/>
+                    </a:p>
+                  </a:txBody>
+                  <a:tcPr/>
+                </a:tc>
+                <a:tc>
+                  <a:txBody>
+                    <a:bodyPr/>
+                    <a:lstStyle/>
+                    <a:p>
+                      <a:pPr algn="ctr"/>
+                      <a:endParaRPr lang="fr-FR" sz="1000" dirty="0"/>
+                    </a:p>
+                  </a:txBody>
+                  <a:tcPr/>
+                </a:tc>
+                <a:tc>
+                  <a:txBody>
+                    <a:bodyPr/>
+                    <a:lstStyle/>
+                    <a:p>
+                      <a:pPr algn="ctr"/>
+                      <a:endParaRPr lang="fr-FR" sz="1000" dirty="0"/>
+                    </a:p>
+                  </a:txBody>
+                  <a:tcPr/>
+                </a:tc>
+                <a:extLst>
+                  <a:ext uri="{0D108BD9-81ED-4DB2-BD59-A6C34878D82A}">
+                    <a16:rowId xmlns:a16="http://schemas.microsoft.com/office/drawing/2014/main" val="1474716101"/>
+                  </a:ext>
+                </a:extLst>
+              </a:tr>
+            </a:tbl>
+          </a:graphicData>
+        </a:graphic>
+      </p:graphicFrame>
+    </p:spTree>
+    <p:extLst>
+      <p:ext uri="{BB962C8B-B14F-4D97-AF65-F5344CB8AC3E}">
+        <p14:creationId xmlns:p14="http://schemas.microsoft.com/office/powerpoint/2010/main" val="1683498524"/>
       </p:ext>
     </p:extLst>
   </p:cSld>

</xml_diff>

<commit_message>
Mise en place des relations d'heritage, Ajout des constructeurs Pouvoir, Ajout de tout les Pouvoirs
</commit_message>
<xml_diff>
--- a/Resume.pptx
+++ b/Resume.pptx
@@ -8,6 +8,7 @@
     <p:sldId id="256" r:id="rId2"/>
     <p:sldId id="257" r:id="rId3"/>
     <p:sldId id="258" r:id="rId4"/>
+    <p:sldId id="259" r:id="rId5"/>
   </p:sldIdLst>
   <p:sldSz cx="12192000" cy="6858000"/>
   <p:notesSz cx="6858000" cy="9144000"/>
@@ -261,7 +262,7 @@
           <a:p>
             <a:fld id="{769780AF-EA56-41AC-8361-B9AF9FB6F450}" type="datetimeFigureOut">
               <a:rPr lang="fr-FR" smtClean="0"/>
-              <a:t>15/05/2018</a:t>
+              <a:t>16/05/2018</a:t>
             </a:fld>
             <a:endParaRPr lang="fr-FR"/>
           </a:p>
@@ -459,7 +460,7 @@
           <a:p>
             <a:fld id="{769780AF-EA56-41AC-8361-B9AF9FB6F450}" type="datetimeFigureOut">
               <a:rPr lang="fr-FR" smtClean="0"/>
-              <a:t>15/05/2018</a:t>
+              <a:t>16/05/2018</a:t>
             </a:fld>
             <a:endParaRPr lang="fr-FR"/>
           </a:p>
@@ -667,7 +668,7 @@
           <a:p>
             <a:fld id="{769780AF-EA56-41AC-8361-B9AF9FB6F450}" type="datetimeFigureOut">
               <a:rPr lang="fr-FR" smtClean="0"/>
-              <a:t>15/05/2018</a:t>
+              <a:t>16/05/2018</a:t>
             </a:fld>
             <a:endParaRPr lang="fr-FR"/>
           </a:p>
@@ -865,7 +866,7 @@
           <a:p>
             <a:fld id="{769780AF-EA56-41AC-8361-B9AF9FB6F450}" type="datetimeFigureOut">
               <a:rPr lang="fr-FR" smtClean="0"/>
-              <a:t>15/05/2018</a:t>
+              <a:t>16/05/2018</a:t>
             </a:fld>
             <a:endParaRPr lang="fr-FR"/>
           </a:p>
@@ -1140,7 +1141,7 @@
           <a:p>
             <a:fld id="{769780AF-EA56-41AC-8361-B9AF9FB6F450}" type="datetimeFigureOut">
               <a:rPr lang="fr-FR" smtClean="0"/>
-              <a:t>15/05/2018</a:t>
+              <a:t>16/05/2018</a:t>
             </a:fld>
             <a:endParaRPr lang="fr-FR"/>
           </a:p>
@@ -1405,7 +1406,7 @@
           <a:p>
             <a:fld id="{769780AF-EA56-41AC-8361-B9AF9FB6F450}" type="datetimeFigureOut">
               <a:rPr lang="fr-FR" smtClean="0"/>
-              <a:t>15/05/2018</a:t>
+              <a:t>16/05/2018</a:t>
             </a:fld>
             <a:endParaRPr lang="fr-FR"/>
           </a:p>
@@ -1817,7 +1818,7 @@
           <a:p>
             <a:fld id="{769780AF-EA56-41AC-8361-B9AF9FB6F450}" type="datetimeFigureOut">
               <a:rPr lang="fr-FR" smtClean="0"/>
-              <a:t>15/05/2018</a:t>
+              <a:t>16/05/2018</a:t>
             </a:fld>
             <a:endParaRPr lang="fr-FR"/>
           </a:p>
@@ -1958,7 +1959,7 @@
           <a:p>
             <a:fld id="{769780AF-EA56-41AC-8361-B9AF9FB6F450}" type="datetimeFigureOut">
               <a:rPr lang="fr-FR" smtClean="0"/>
-              <a:t>15/05/2018</a:t>
+              <a:t>16/05/2018</a:t>
             </a:fld>
             <a:endParaRPr lang="fr-FR"/>
           </a:p>
@@ -2071,7 +2072,7 @@
           <a:p>
             <a:fld id="{769780AF-EA56-41AC-8361-B9AF9FB6F450}" type="datetimeFigureOut">
               <a:rPr lang="fr-FR" smtClean="0"/>
-              <a:t>15/05/2018</a:t>
+              <a:t>16/05/2018</a:t>
             </a:fld>
             <a:endParaRPr lang="fr-FR"/>
           </a:p>
@@ -2382,7 +2383,7 @@
           <a:p>
             <a:fld id="{769780AF-EA56-41AC-8361-B9AF9FB6F450}" type="datetimeFigureOut">
               <a:rPr lang="fr-FR" smtClean="0"/>
-              <a:t>15/05/2018</a:t>
+              <a:t>16/05/2018</a:t>
             </a:fld>
             <a:endParaRPr lang="fr-FR"/>
           </a:p>
@@ -2670,7 +2671,7 @@
           <a:p>
             <a:fld id="{769780AF-EA56-41AC-8361-B9AF9FB6F450}" type="datetimeFigureOut">
               <a:rPr lang="fr-FR" smtClean="0"/>
-              <a:t>15/05/2018</a:t>
+              <a:t>16/05/2018</a:t>
             </a:fld>
             <a:endParaRPr lang="fr-FR"/>
           </a:p>
@@ -2911,7 +2912,7 @@
           <a:p>
             <a:fld id="{769780AF-EA56-41AC-8361-B9AF9FB6F450}" type="datetimeFigureOut">
               <a:rPr lang="fr-FR" smtClean="0"/>
-              <a:t>15/05/2018</a:t>
+              <a:t>16/05/2018</a:t>
             </a:fld>
             <a:endParaRPr lang="fr-FR"/>
           </a:p>
@@ -6723,7 +6724,7 @@
           <p:nvPr>
             <p:extLst>
               <p:ext uri="{D42A27DB-BD31-4B8C-83A1-F6EECF244321}">
-                <p14:modId xmlns:p14="http://schemas.microsoft.com/office/powerpoint/2010/main" val="1243834478"/>
+                <p14:modId xmlns:p14="http://schemas.microsoft.com/office/powerpoint/2010/main" val="1230540011"/>
               </p:ext>
             </p:extLst>
           </p:nvPr>
@@ -7337,21 +7338,21 @@
                       <a:pPr algn="ctr"/>
                       <a:r>
                         <a:rPr lang="fr-FR" sz="1000" dirty="0"/>
-                        <a:t>5</a:t>
-                      </a:r>
-                    </a:p>
-                  </a:txBody>
-                  <a:tcPr/>
-                </a:tc>
-                <a:tc>
-                  <a:txBody>
-                    <a:bodyPr/>
-                    <a:lstStyle/>
-                    <a:p>
-                      <a:pPr algn="ctr"/>
-                      <a:r>
-                        <a:rPr lang="fr-FR" sz="1000" dirty="0"/>
-                        <a:t>180</a:t>
+                        <a:t>3</a:t>
+                      </a:r>
+                    </a:p>
+                  </a:txBody>
+                  <a:tcPr/>
+                </a:tc>
+                <a:tc>
+                  <a:txBody>
+                    <a:bodyPr/>
+                    <a:lstStyle/>
+                    <a:p>
+                      <a:pPr algn="ctr"/>
+                      <a:r>
+                        <a:rPr lang="fr-FR" sz="1000" dirty="0"/>
+                        <a:t>300</a:t>
                       </a:r>
                     </a:p>
                   </a:txBody>
@@ -7377,7 +7378,10 @@
                     <a:lstStyle/>
                     <a:p>
                       <a:pPr algn="ctr"/>
-                      <a:endParaRPr lang="fr-FR" sz="1000" dirty="0"/>
+                      <a:r>
+                        <a:rPr lang="fr-FR" sz="1000" dirty="0"/>
+                        <a:t>spé</a:t>
+                      </a:r>
                     </a:p>
                   </a:txBody>
                   <a:tcPr/>
@@ -7506,7 +7510,7 @@
                       <a:pPr algn="ctr"/>
                       <a:r>
                         <a:rPr lang="fr-FR" sz="1000" dirty="0"/>
-                        <a:t>150</a:t>
+                        <a:t>210</a:t>
                       </a:r>
                     </a:p>
                   </a:txBody>
@@ -7650,7 +7654,7 @@
                       <a:pPr algn="ctr"/>
                       <a:r>
                         <a:rPr lang="fr-FR" sz="1000" dirty="0"/>
-                        <a:t>20</a:t>
+                        <a:t>10</a:t>
                       </a:r>
                     </a:p>
                   </a:txBody>
@@ -7805,35 +7809,35 @@
                       <a:pPr algn="ctr"/>
                       <a:r>
                         <a:rPr lang="fr-FR" sz="1000" dirty="0"/>
-                        <a:t>10</a:t>
-                      </a:r>
-                    </a:p>
-                  </a:txBody>
-                  <a:tcPr/>
-                </a:tc>
-                <a:tc>
-                  <a:txBody>
-                    <a:bodyPr/>
-                    <a:lstStyle/>
-                    <a:p>
-                      <a:pPr algn="ctr"/>
-                      <a:r>
-                        <a:rPr lang="fr-FR" sz="1000" dirty="0"/>
-                        <a:t>25</a:t>
-                      </a:r>
-                    </a:p>
-                  </a:txBody>
-                  <a:tcPr/>
-                </a:tc>
-                <a:tc>
-                  <a:txBody>
-                    <a:bodyPr/>
-                    <a:lstStyle/>
-                    <a:p>
-                      <a:pPr algn="ctr"/>
-                      <a:r>
-                        <a:rPr lang="fr-FR" sz="1000" dirty="0"/>
-                        <a:t>80</a:t>
+                        <a:t>30</a:t>
+                      </a:r>
+                    </a:p>
+                  </a:txBody>
+                  <a:tcPr/>
+                </a:tc>
+                <a:tc>
+                  <a:txBody>
+                    <a:bodyPr/>
+                    <a:lstStyle/>
+                    <a:p>
+                      <a:pPr algn="ctr"/>
+                      <a:r>
+                        <a:rPr lang="fr-FR" sz="1000" dirty="0"/>
+                        <a:t>75</a:t>
+                      </a:r>
+                    </a:p>
+                  </a:txBody>
+                  <a:tcPr/>
+                </a:tc>
+                <a:tc>
+                  <a:txBody>
+                    <a:bodyPr/>
+                    <a:lstStyle/>
+                    <a:p>
+                      <a:pPr algn="ctr"/>
+                      <a:r>
+                        <a:rPr lang="fr-FR" sz="1000" dirty="0"/>
+                        <a:t>70</a:t>
                       </a:r>
                     </a:p>
                   </a:txBody>
@@ -7988,7 +7992,7 @@
                       <a:pPr algn="ctr"/>
                       <a:r>
                         <a:rPr lang="fr-FR" sz="1000" dirty="0"/>
-                        <a:t>50</a:t>
+                        <a:t>40</a:t>
                       </a:r>
                     </a:p>
                   </a:txBody>
@@ -8156,10 +8160,9 @@
                     <a:p>
                       <a:pPr algn="ctr"/>
                       <a:r>
-                        <a:rPr lang="fr-FR" sz="1000"/>
+                        <a:rPr lang="fr-FR" sz="1000" dirty="0"/>
                         <a:t>spé</a:t>
                       </a:r>
-                      <a:endParaRPr lang="fr-FR" sz="1000" dirty="0"/>
                     </a:p>
                   </a:txBody>
                   <a:tcPr/>
@@ -8244,6 +8247,282 @@
     <p:extLst>
       <p:ext uri="{BB962C8B-B14F-4D97-AF65-F5344CB8AC3E}">
         <p14:creationId xmlns:p14="http://schemas.microsoft.com/office/powerpoint/2010/main" val="1683498524"/>
+      </p:ext>
+    </p:extLst>
+  </p:cSld>
+  <p:clrMapOvr>
+    <a:masterClrMapping/>
+  </p:clrMapOvr>
+</p:sld>
+</file>
+
+<file path=ppt/slides/slide4.xml><?xml version="1.0" encoding="utf-8"?>
+<p:sld xmlns:a="http://schemas.openxmlformats.org/drawingml/2006/main" xmlns:r="http://schemas.openxmlformats.org/officeDocument/2006/relationships" xmlns:p="http://schemas.openxmlformats.org/presentationml/2006/main">
+  <p:cSld>
+    <p:spTree>
+      <p:nvGrpSpPr>
+        <p:cNvPr id="1" name=""/>
+        <p:cNvGrpSpPr/>
+        <p:nvPr/>
+      </p:nvGrpSpPr>
+      <p:grpSpPr>
+        <a:xfrm>
+          <a:off x="0" y="0"/>
+          <a:ext cx="0" cy="0"/>
+          <a:chOff x="0" y="0"/>
+          <a:chExt cx="0" cy="0"/>
+        </a:xfrm>
+      </p:grpSpPr>
+      <p:sp>
+        <p:nvSpPr>
+          <p:cNvPr id="4" name="Rectangle 3">
+            <a:extLst>
+              <a:ext uri="{FF2B5EF4-FFF2-40B4-BE49-F238E27FC236}">
+                <a16:creationId xmlns:a16="http://schemas.microsoft.com/office/drawing/2014/main" id="{2BA77ABE-25D0-4CFA-BA27-91791C1A6C1C}"/>
+              </a:ext>
+            </a:extLst>
+          </p:cNvPr>
+          <p:cNvSpPr/>
+          <p:nvPr/>
+        </p:nvSpPr>
+        <p:spPr>
+          <a:xfrm>
+            <a:off x="711200" y="850900"/>
+            <a:ext cx="2730500" cy="1168400"/>
+          </a:xfrm>
+          <a:prstGeom prst="rect">
+            <a:avLst/>
+          </a:prstGeom>
+          <a:solidFill>
+            <a:schemeClr val="tx2">
+              <a:lumMod val="50000"/>
+            </a:schemeClr>
+          </a:solidFill>
+        </p:spPr>
+        <p:style>
+          <a:lnRef idx="2">
+            <a:schemeClr val="accent1">
+              <a:shade val="50000"/>
+            </a:schemeClr>
+          </a:lnRef>
+          <a:fillRef idx="1">
+            <a:schemeClr val="accent1"/>
+          </a:fillRef>
+          <a:effectRef idx="0">
+            <a:schemeClr val="accent1"/>
+          </a:effectRef>
+          <a:fontRef idx="minor">
+            <a:schemeClr val="lt1"/>
+          </a:fontRef>
+        </p:style>
+        <p:txBody>
+          <a:bodyPr rtlCol="0" anchor="ctr"/>
+          <a:lstStyle/>
+          <a:p>
+            <a:pPr algn="ctr"/>
+            <a:r>
+              <a:rPr lang="fr-FR" dirty="0"/>
+              <a:t>POUVOIR</a:t>
+            </a:r>
+          </a:p>
+        </p:txBody>
+      </p:sp>
+      <p:sp>
+        <p:nvSpPr>
+          <p:cNvPr id="5" name="Rectangle 4">
+            <a:extLst>
+              <a:ext uri="{FF2B5EF4-FFF2-40B4-BE49-F238E27FC236}">
+                <a16:creationId xmlns:a16="http://schemas.microsoft.com/office/drawing/2014/main" id="{B92902D9-819F-4949-A0BB-F186AEFAB7A0}"/>
+              </a:ext>
+            </a:extLst>
+          </p:cNvPr>
+          <p:cNvSpPr/>
+          <p:nvPr/>
+        </p:nvSpPr>
+        <p:spPr>
+          <a:xfrm>
+            <a:off x="8166100" y="850900"/>
+            <a:ext cx="2730500" cy="1168400"/>
+          </a:xfrm>
+          <a:prstGeom prst="rect">
+            <a:avLst/>
+          </a:prstGeom>
+          <a:solidFill>
+            <a:schemeClr val="tx2">
+              <a:lumMod val="50000"/>
+            </a:schemeClr>
+          </a:solidFill>
+        </p:spPr>
+        <p:style>
+          <a:lnRef idx="2">
+            <a:schemeClr val="accent1">
+              <a:shade val="50000"/>
+            </a:schemeClr>
+          </a:lnRef>
+          <a:fillRef idx="1">
+            <a:schemeClr val="accent1"/>
+          </a:fillRef>
+          <a:effectRef idx="0">
+            <a:schemeClr val="accent1"/>
+          </a:effectRef>
+          <a:fontRef idx="minor">
+            <a:schemeClr val="lt1"/>
+          </a:fontRef>
+        </p:style>
+        <p:txBody>
+          <a:bodyPr rtlCol="0" anchor="ctr"/>
+          <a:lstStyle/>
+          <a:p>
+            <a:pPr algn="ctr"/>
+            <a:r>
+              <a:rPr lang="fr-FR" dirty="0"/>
+              <a:t>OBJET</a:t>
+            </a:r>
+          </a:p>
+        </p:txBody>
+      </p:sp>
+      <p:sp>
+        <p:nvSpPr>
+          <p:cNvPr id="6" name="Rectangle 5">
+            <a:extLst>
+              <a:ext uri="{FF2B5EF4-FFF2-40B4-BE49-F238E27FC236}">
+                <a16:creationId xmlns:a16="http://schemas.microsoft.com/office/drawing/2014/main" id="{D6ADA79D-044A-4EED-B686-0E16F95F816F}"/>
+              </a:ext>
+            </a:extLst>
+          </p:cNvPr>
+          <p:cNvSpPr/>
+          <p:nvPr/>
+        </p:nvSpPr>
+        <p:spPr>
+          <a:xfrm>
+            <a:off x="4730750" y="3429000"/>
+            <a:ext cx="2730500" cy="1168400"/>
+          </a:xfrm>
+          <a:prstGeom prst="rect">
+            <a:avLst/>
+          </a:prstGeom>
+          <a:solidFill>
+            <a:schemeClr val="tx2">
+              <a:lumMod val="50000"/>
+            </a:schemeClr>
+          </a:solidFill>
+        </p:spPr>
+        <p:style>
+          <a:lnRef idx="2">
+            <a:schemeClr val="accent1">
+              <a:shade val="50000"/>
+            </a:schemeClr>
+          </a:lnRef>
+          <a:fillRef idx="1">
+            <a:schemeClr val="accent1"/>
+          </a:fillRef>
+          <a:effectRef idx="0">
+            <a:schemeClr val="accent1"/>
+          </a:effectRef>
+          <a:fontRef idx="minor">
+            <a:schemeClr val="lt1"/>
+          </a:fontRef>
+        </p:style>
+        <p:txBody>
+          <a:bodyPr rtlCol="0" anchor="ctr"/>
+          <a:lstStyle/>
+          <a:p>
+            <a:pPr algn="ctr"/>
+            <a:r>
+              <a:rPr lang="fr-FR" dirty="0"/>
+              <a:t>POKEMON</a:t>
+            </a:r>
+          </a:p>
+        </p:txBody>
+      </p:sp>
+      <p:cxnSp>
+        <p:nvCxnSpPr>
+          <p:cNvPr id="8" name="Connecteur droit avec flèche 7">
+            <a:extLst>
+              <a:ext uri="{FF2B5EF4-FFF2-40B4-BE49-F238E27FC236}">
+                <a16:creationId xmlns:a16="http://schemas.microsoft.com/office/drawing/2014/main" id="{02F8D4AC-2C70-4108-92C2-7ABB4644867D}"/>
+              </a:ext>
+            </a:extLst>
+          </p:cNvPr>
+          <p:cNvCxnSpPr>
+            <a:stCxn id="6" idx="1"/>
+            <a:endCxn id="4" idx="2"/>
+          </p:cNvCxnSpPr>
+          <p:nvPr/>
+        </p:nvCxnSpPr>
+        <p:spPr>
+          <a:xfrm flipH="1" flipV="1">
+            <a:off x="2076450" y="2019300"/>
+            <a:ext cx="2654300" cy="1993900"/>
+          </a:xfrm>
+          <a:prstGeom prst="straightConnector1">
+            <a:avLst/>
+          </a:prstGeom>
+          <a:ln w="76200">
+            <a:tailEnd type="triangle"/>
+          </a:ln>
+        </p:spPr>
+        <p:style>
+          <a:lnRef idx="1">
+            <a:schemeClr val="accent1"/>
+          </a:lnRef>
+          <a:fillRef idx="0">
+            <a:schemeClr val="accent1"/>
+          </a:fillRef>
+          <a:effectRef idx="0">
+            <a:schemeClr val="accent1"/>
+          </a:effectRef>
+          <a:fontRef idx="minor">
+            <a:schemeClr val="tx1"/>
+          </a:fontRef>
+        </p:style>
+      </p:cxnSp>
+      <p:cxnSp>
+        <p:nvCxnSpPr>
+          <p:cNvPr id="9" name="Connecteur droit avec flèche 8">
+            <a:extLst>
+              <a:ext uri="{FF2B5EF4-FFF2-40B4-BE49-F238E27FC236}">
+                <a16:creationId xmlns:a16="http://schemas.microsoft.com/office/drawing/2014/main" id="{C8D26AB6-8CA1-4583-85E8-D95AF3A0B364}"/>
+              </a:ext>
+            </a:extLst>
+          </p:cNvPr>
+          <p:cNvCxnSpPr>
+            <a:cxnSpLocks/>
+            <a:stCxn id="6" idx="3"/>
+          </p:cNvCxnSpPr>
+          <p:nvPr/>
+        </p:nvCxnSpPr>
+        <p:spPr>
+          <a:xfrm flipV="1">
+            <a:off x="7461250" y="2025650"/>
+            <a:ext cx="2070100" cy="1987550"/>
+          </a:xfrm>
+          <a:prstGeom prst="straightConnector1">
+            <a:avLst/>
+          </a:prstGeom>
+          <a:ln w="76200">
+            <a:tailEnd type="triangle"/>
+          </a:ln>
+        </p:spPr>
+        <p:style>
+          <a:lnRef idx="1">
+            <a:schemeClr val="accent1"/>
+          </a:lnRef>
+          <a:fillRef idx="0">
+            <a:schemeClr val="accent1"/>
+          </a:fillRef>
+          <a:effectRef idx="0">
+            <a:schemeClr val="accent1"/>
+          </a:effectRef>
+          <a:fontRef idx="minor">
+            <a:schemeClr val="tx1"/>
+          </a:fontRef>
+        </p:style>
+      </p:cxnSp>
+    </p:spTree>
+    <p:extLst>
+      <p:ext uri="{BB962C8B-B14F-4D97-AF65-F5344CB8AC3E}">
+        <p14:creationId xmlns:p14="http://schemas.microsoft.com/office/powerpoint/2010/main" val="2736792528"/>
       </p:ext>
     </p:extLst>
   </p:cSld>

</xml_diff>